<commit_message>
the Dusty Gas Model is finally working in the matrix form. Now it has to be formatted to a class
</commit_message>
<xml_diff>
--- a/Sketches.pptx
+++ b/Sketches.pptx
@@ -5,8 +5,16 @@
     <p:sldMasterId id="2147483648" r:id="rId1"/>
   </p:sldMasterIdLst>
   <p:sldIdLst>
-    <p:sldId id="256" r:id="rId2"/>
-    <p:sldId id="257" r:id="rId3"/>
+    <p:sldId id="257" r:id="rId2"/>
+    <p:sldId id="265" r:id="rId3"/>
+    <p:sldId id="258" r:id="rId4"/>
+    <p:sldId id="262" r:id="rId5"/>
+    <p:sldId id="263" r:id="rId6"/>
+    <p:sldId id="259" r:id="rId7"/>
+    <p:sldId id="264" r:id="rId8"/>
+    <p:sldId id="256" r:id="rId9"/>
+    <p:sldId id="260" r:id="rId10"/>
+    <p:sldId id="261" r:id="rId11"/>
   </p:sldIdLst>
   <p:sldSz cx="12192000" cy="6858000"/>
   <p:notesSz cx="6858000" cy="9144000"/>
@@ -105,6 +113,11 @@
       </a:defRPr>
     </a:lvl9pPr>
   </p:defaultTextStyle>
+  <p:extLst>
+    <p:ext uri="{EFAFB233-063F-42B5-8137-9DF3F51BA10A}">
+      <p15:sldGuideLst xmlns:p15="http://schemas.microsoft.com/office/powerpoint/2012/main"/>
+    </p:ext>
+  </p:extLst>
 </p:presentation>
 </file>
 
@@ -257,7 +270,7 @@
           <a:p>
             <a:fld id="{67C9BBA9-1C82-4491-A951-1CC26D66E274}" type="datetimeFigureOut">
               <a:rPr lang="en-US" smtClean="0"/>
-              <a:t>9/8/2025</a:t>
+              <a:t>9/9/2025</a:t>
             </a:fld>
             <a:endParaRPr lang="en-US"/>
           </a:p>
@@ -457,7 +470,7 @@
           <a:p>
             <a:fld id="{67C9BBA9-1C82-4491-A951-1CC26D66E274}" type="datetimeFigureOut">
               <a:rPr lang="en-US" smtClean="0"/>
-              <a:t>9/8/2025</a:t>
+              <a:t>9/9/2025</a:t>
             </a:fld>
             <a:endParaRPr lang="en-US"/>
           </a:p>
@@ -667,7 +680,7 @@
           <a:p>
             <a:fld id="{67C9BBA9-1C82-4491-A951-1CC26D66E274}" type="datetimeFigureOut">
               <a:rPr lang="en-US" smtClean="0"/>
-              <a:t>9/8/2025</a:t>
+              <a:t>9/9/2025</a:t>
             </a:fld>
             <a:endParaRPr lang="en-US"/>
           </a:p>
@@ -867,7 +880,7 @@
           <a:p>
             <a:fld id="{67C9BBA9-1C82-4491-A951-1CC26D66E274}" type="datetimeFigureOut">
               <a:rPr lang="en-US" smtClean="0"/>
-              <a:t>9/8/2025</a:t>
+              <a:t>9/9/2025</a:t>
             </a:fld>
             <a:endParaRPr lang="en-US"/>
           </a:p>
@@ -1143,7 +1156,7 @@
           <a:p>
             <a:fld id="{67C9BBA9-1C82-4491-A951-1CC26D66E274}" type="datetimeFigureOut">
               <a:rPr lang="en-US" smtClean="0"/>
-              <a:t>9/8/2025</a:t>
+              <a:t>9/9/2025</a:t>
             </a:fld>
             <a:endParaRPr lang="en-US"/>
           </a:p>
@@ -1411,7 +1424,7 @@
           <a:p>
             <a:fld id="{67C9BBA9-1C82-4491-A951-1CC26D66E274}" type="datetimeFigureOut">
               <a:rPr lang="en-US" smtClean="0"/>
-              <a:t>9/8/2025</a:t>
+              <a:t>9/9/2025</a:t>
             </a:fld>
             <a:endParaRPr lang="en-US"/>
           </a:p>
@@ -1826,7 +1839,7 @@
           <a:p>
             <a:fld id="{67C9BBA9-1C82-4491-A951-1CC26D66E274}" type="datetimeFigureOut">
               <a:rPr lang="en-US" smtClean="0"/>
-              <a:t>9/8/2025</a:t>
+              <a:t>9/9/2025</a:t>
             </a:fld>
             <a:endParaRPr lang="en-US"/>
           </a:p>
@@ -1968,7 +1981,7 @@
           <a:p>
             <a:fld id="{67C9BBA9-1C82-4491-A951-1CC26D66E274}" type="datetimeFigureOut">
               <a:rPr lang="en-US" smtClean="0"/>
-              <a:t>9/8/2025</a:t>
+              <a:t>9/9/2025</a:t>
             </a:fld>
             <a:endParaRPr lang="en-US"/>
           </a:p>
@@ -2081,7 +2094,7 @@
           <a:p>
             <a:fld id="{67C9BBA9-1C82-4491-A951-1CC26D66E274}" type="datetimeFigureOut">
               <a:rPr lang="en-US" smtClean="0"/>
-              <a:t>9/8/2025</a:t>
+              <a:t>9/9/2025</a:t>
             </a:fld>
             <a:endParaRPr lang="en-US"/>
           </a:p>
@@ -2394,7 +2407,7 @@
           <a:p>
             <a:fld id="{67C9BBA9-1C82-4491-A951-1CC26D66E274}" type="datetimeFigureOut">
               <a:rPr lang="en-US" smtClean="0"/>
-              <a:t>9/8/2025</a:t>
+              <a:t>9/9/2025</a:t>
             </a:fld>
             <a:endParaRPr lang="en-US"/>
           </a:p>
@@ -2683,7 +2696,7 @@
           <a:p>
             <a:fld id="{67C9BBA9-1C82-4491-A951-1CC26D66E274}" type="datetimeFigureOut">
               <a:rPr lang="en-US" smtClean="0"/>
-              <a:t>9/8/2025</a:t>
+              <a:t>9/9/2025</a:t>
             </a:fld>
             <a:endParaRPr lang="en-US"/>
           </a:p>
@@ -2926,7 +2939,7 @@
           <a:p>
             <a:fld id="{67C9BBA9-1C82-4491-A951-1CC26D66E274}" type="datetimeFigureOut">
               <a:rPr lang="en-US" smtClean="0"/>
-              <a:t>9/8/2025</a:t>
+              <a:t>9/9/2025</a:t>
             </a:fld>
             <a:endParaRPr lang="en-US"/>
           </a:p>
@@ -3343,6 +3356,3605 @@
           <a:chExt cx="0" cy="0"/>
         </a:xfrm>
       </p:grpSpPr>
+      <p:sp>
+        <p:nvSpPr>
+          <p:cNvPr id="2" name="Titel 1">
+            <a:extLst>
+              <a:ext uri="{FF2B5EF4-FFF2-40B4-BE49-F238E27FC236}">
+                <a16:creationId xmlns:a16="http://schemas.microsoft.com/office/drawing/2014/main" id="{8F5BBBEC-54B4-30A5-2159-848ADDA8FEE7}"/>
+              </a:ext>
+            </a:extLst>
+          </p:cNvPr>
+          <p:cNvSpPr>
+            <a:spLocks noGrp="1"/>
+          </p:cNvSpPr>
+          <p:nvPr>
+            <p:ph type="title"/>
+          </p:nvPr>
+        </p:nvSpPr>
+        <p:spPr/>
+        <p:txBody>
+          <a:bodyPr/>
+          <a:lstStyle/>
+          <a:p>
+            <a:r>
+              <a:rPr lang="de-DE" dirty="0"/>
+              <a:t>Zhu Paper</a:t>
+            </a:r>
+            <a:endParaRPr lang="en-US" dirty="0"/>
+          </a:p>
+        </p:txBody>
+      </p:sp>
+      <p:sp>
+        <p:nvSpPr>
+          <p:cNvPr id="3" name="Inhaltsplatzhalter 2">
+            <a:extLst>
+              <a:ext uri="{FF2B5EF4-FFF2-40B4-BE49-F238E27FC236}">
+                <a16:creationId xmlns:a16="http://schemas.microsoft.com/office/drawing/2014/main" id="{ECB6594E-8AFB-826B-514A-106DB8437427}"/>
+              </a:ext>
+            </a:extLst>
+          </p:cNvPr>
+          <p:cNvSpPr>
+            <a:spLocks noGrp="1"/>
+          </p:cNvSpPr>
+          <p:nvPr>
+            <p:ph idx="1"/>
+          </p:nvPr>
+        </p:nvSpPr>
+        <p:spPr/>
+        <p:txBody>
+          <a:bodyPr/>
+          <a:lstStyle/>
+          <a:p>
+            <a:r>
+              <a:rPr lang="de-DE" dirty="0"/>
+              <a:t>Es wird eine Konzentration an beiden Interfaces berechnet und dann eine Stromstärke dazu aufgelöst.</a:t>
+            </a:r>
+            <a:endParaRPr lang="en-US" dirty="0"/>
+          </a:p>
+        </p:txBody>
+      </p:sp>
+    </p:spTree>
+    <p:extLst>
+      <p:ext uri="{BB962C8B-B14F-4D97-AF65-F5344CB8AC3E}">
+        <p14:creationId xmlns:p14="http://schemas.microsoft.com/office/powerpoint/2010/main" val="1662364544"/>
+      </p:ext>
+    </p:extLst>
+  </p:cSld>
+  <p:clrMapOvr>
+    <a:masterClrMapping/>
+  </p:clrMapOvr>
+</p:sld>
+</file>
+
+<file path=ppt/slides/slide10.xml><?xml version="1.0" encoding="utf-8"?>
+<p:sld xmlns:a="http://schemas.openxmlformats.org/drawingml/2006/main" xmlns:r="http://schemas.openxmlformats.org/officeDocument/2006/relationships" xmlns:p="http://schemas.openxmlformats.org/presentationml/2006/main">
+  <p:cSld>
+    <p:spTree>
+      <p:nvGrpSpPr>
+        <p:cNvPr id="1" name=""/>
+        <p:cNvGrpSpPr/>
+        <p:nvPr/>
+      </p:nvGrpSpPr>
+      <p:grpSpPr>
+        <a:xfrm>
+          <a:off x="0" y="0"/>
+          <a:ext cx="0" cy="0"/>
+          <a:chOff x="0" y="0"/>
+          <a:chExt cx="0" cy="0"/>
+        </a:xfrm>
+      </p:grpSpPr>
+      <p:sp>
+        <p:nvSpPr>
+          <p:cNvPr id="2" name="Titel 1">
+            <a:extLst>
+              <a:ext uri="{FF2B5EF4-FFF2-40B4-BE49-F238E27FC236}">
+                <a16:creationId xmlns:a16="http://schemas.microsoft.com/office/drawing/2014/main" id="{0B386DDC-E429-7434-513B-9F8F98550C2D}"/>
+              </a:ext>
+            </a:extLst>
+          </p:cNvPr>
+          <p:cNvSpPr>
+            <a:spLocks noGrp="1"/>
+          </p:cNvSpPr>
+          <p:nvPr>
+            <p:ph type="title"/>
+          </p:nvPr>
+        </p:nvSpPr>
+        <p:spPr/>
+        <p:txBody>
+          <a:bodyPr/>
+          <a:lstStyle/>
+          <a:p>
+            <a:r>
+              <a:rPr lang="de-DE" dirty="0"/>
+              <a:t>Meine Interessen und Fortbildungswünsche</a:t>
+            </a:r>
+            <a:endParaRPr lang="en-US" dirty="0"/>
+          </a:p>
+        </p:txBody>
+      </p:sp>
+      <p:sp>
+        <p:nvSpPr>
+          <p:cNvPr id="3" name="Textfeld 2">
+            <a:extLst>
+              <a:ext uri="{FF2B5EF4-FFF2-40B4-BE49-F238E27FC236}">
+                <a16:creationId xmlns:a16="http://schemas.microsoft.com/office/drawing/2014/main" id="{A7E62908-4D2B-5477-053A-587AD3D4FCFA}"/>
+              </a:ext>
+            </a:extLst>
+          </p:cNvPr>
+          <p:cNvSpPr txBox="1"/>
+          <p:nvPr/>
+        </p:nvSpPr>
+        <p:spPr>
+          <a:xfrm>
+            <a:off x="969818" y="1588655"/>
+            <a:ext cx="8645237" cy="4078039"/>
+          </a:xfrm>
+          <a:prstGeom prst="rect">
+            <a:avLst/>
+          </a:prstGeom>
+          <a:noFill/>
+        </p:spPr>
+        <p:txBody>
+          <a:bodyPr wrap="square" rtlCol="0">
+            <a:spAutoFit/>
+          </a:bodyPr>
+          <a:lstStyle/>
+          <a:p>
+            <a:pPr marL="285750" indent="-285750">
+              <a:spcAft>
+                <a:spcPts val="600"/>
+              </a:spcAft>
+              <a:buFont typeface="Wingdings" panose="05000000000000000000" pitchFamily="2" charset="2"/>
+              <a:buChar char="n"/>
+            </a:pPr>
+            <a:r>
+              <a:rPr lang="de-DE" dirty="0"/>
+              <a:t>Ich bin an dem generellen Thema der </a:t>
+            </a:r>
+            <a:r>
+              <a:rPr lang="de-DE" dirty="0" err="1"/>
+              <a:t>rSOC</a:t>
+            </a:r>
+            <a:r>
+              <a:rPr lang="de-DE" dirty="0"/>
+              <a:t> sehr interessiert</a:t>
+            </a:r>
+          </a:p>
+          <a:p>
+            <a:pPr marL="742950" lvl="1" indent="-285750">
+              <a:spcAft>
+                <a:spcPts val="600"/>
+              </a:spcAft>
+              <a:buFont typeface="Courier New" panose="02070309020205020404" pitchFamily="49" charset="0"/>
+              <a:buChar char="o"/>
+            </a:pPr>
+            <a:r>
+              <a:rPr lang="de-DE" dirty="0"/>
+              <a:t>Besonders am Aufstellen und Verbessern von numerischen Modellen </a:t>
+            </a:r>
+          </a:p>
+          <a:p>
+            <a:pPr marL="742950" lvl="1" indent="-285750">
+              <a:spcAft>
+                <a:spcPts val="600"/>
+              </a:spcAft>
+              <a:buFont typeface="Courier New" panose="02070309020205020404" pitchFamily="49" charset="0"/>
+              <a:buChar char="o"/>
+            </a:pPr>
+            <a:r>
+              <a:rPr lang="de-DE" dirty="0"/>
+              <a:t>Den Teststand sehe ich als essentiell an, aber mit dem derzeitigen Equipment ist das experimentelle Arbeiten limitiert. Ein µ-CT oder REM könnte dies bereits ändern.</a:t>
+            </a:r>
+          </a:p>
+          <a:p>
+            <a:pPr marL="285750" indent="-285750">
+              <a:spcAft>
+                <a:spcPts val="600"/>
+              </a:spcAft>
+              <a:buFont typeface="Wingdings" panose="05000000000000000000" pitchFamily="2" charset="2"/>
+              <a:buChar char="n"/>
+            </a:pPr>
+            <a:r>
+              <a:rPr lang="de-DE" dirty="0"/>
+              <a:t>Ich würde gerne veröffentlichen, denke aber, dass ich erst Ende nächsten Jahres soweit sein werde. Ich würde mich aber hier auch gerne (verbindlich) drauf festlegen.</a:t>
+            </a:r>
+          </a:p>
+          <a:p>
+            <a:pPr marL="285750" indent="-285750">
+              <a:spcAft>
+                <a:spcPts val="600"/>
+              </a:spcAft>
+              <a:buFont typeface="Wingdings" panose="05000000000000000000" pitchFamily="2" charset="2"/>
+              <a:buChar char="n"/>
+            </a:pPr>
+            <a:r>
+              <a:rPr lang="de-DE" dirty="0"/>
+              <a:t>Ich habe ein Interesse an der Lehre und würde dies gerne jetzt verfolgen. Im späteren Verlauf meiner Promotion bin ich unsicher über meine zeitlichen Kapazitäten.</a:t>
+            </a:r>
+          </a:p>
+          <a:p>
+            <a:pPr marL="285750" indent="-285750">
+              <a:spcAft>
+                <a:spcPts val="600"/>
+              </a:spcAft>
+              <a:buFont typeface="Wingdings" panose="05000000000000000000" pitchFamily="2" charset="2"/>
+              <a:buChar char="n"/>
+            </a:pPr>
+            <a:r>
+              <a:rPr lang="de-DE" dirty="0"/>
+              <a:t>Falls es wieder dazu kommt, dass ich die LBM-Methode verwende, würde ich gerne an der jährlich angebotenen Summer  School teilnehmen. </a:t>
+            </a:r>
+            <a:endParaRPr lang="en-US" dirty="0"/>
+          </a:p>
+        </p:txBody>
+      </p:sp>
+    </p:spTree>
+    <p:extLst>
+      <p:ext uri="{BB962C8B-B14F-4D97-AF65-F5344CB8AC3E}">
+        <p14:creationId xmlns:p14="http://schemas.microsoft.com/office/powerpoint/2010/main" val="3677416661"/>
+      </p:ext>
+    </p:extLst>
+  </p:cSld>
+  <p:clrMapOvr>
+    <a:masterClrMapping/>
+  </p:clrMapOvr>
+</p:sld>
+</file>
+
+<file path=ppt/slides/slide2.xml><?xml version="1.0" encoding="utf-8"?>
+<p:sld xmlns:a="http://schemas.openxmlformats.org/drawingml/2006/main" xmlns:r="http://schemas.openxmlformats.org/officeDocument/2006/relationships" xmlns:p="http://schemas.openxmlformats.org/presentationml/2006/main">
+  <p:cSld>
+    <p:spTree>
+      <p:nvGrpSpPr>
+        <p:cNvPr id="1" name=""/>
+        <p:cNvGrpSpPr/>
+        <p:nvPr/>
+      </p:nvGrpSpPr>
+      <p:grpSpPr>
+        <a:xfrm>
+          <a:off x="0" y="0"/>
+          <a:ext cx="0" cy="0"/>
+          <a:chOff x="0" y="0"/>
+          <a:chExt cx="0" cy="0"/>
+        </a:xfrm>
+      </p:grpSpPr>
+      <p:sp>
+        <p:nvSpPr>
+          <p:cNvPr id="2" name="Titel 1">
+            <a:extLst>
+              <a:ext uri="{FF2B5EF4-FFF2-40B4-BE49-F238E27FC236}">
+                <a16:creationId xmlns:a16="http://schemas.microsoft.com/office/drawing/2014/main" id="{E8DE16E0-DAF3-43E2-0842-276CE0EA1550}"/>
+              </a:ext>
+            </a:extLst>
+          </p:cNvPr>
+          <p:cNvSpPr>
+            <a:spLocks noGrp="1"/>
+          </p:cNvSpPr>
+          <p:nvPr>
+            <p:ph type="title"/>
+          </p:nvPr>
+        </p:nvSpPr>
+        <p:spPr/>
+        <p:txBody>
+          <a:bodyPr/>
+          <a:lstStyle/>
+          <a:p>
+            <a:r>
+              <a:rPr lang="de-DE" dirty="0"/>
+              <a:t>Jahresgespräch</a:t>
+            </a:r>
+            <a:endParaRPr lang="en-US" dirty="0"/>
+          </a:p>
+        </p:txBody>
+      </p:sp>
+      <p:sp>
+        <p:nvSpPr>
+          <p:cNvPr id="3" name="Inhaltsplatzhalter 2">
+            <a:extLst>
+              <a:ext uri="{FF2B5EF4-FFF2-40B4-BE49-F238E27FC236}">
+                <a16:creationId xmlns:a16="http://schemas.microsoft.com/office/drawing/2014/main" id="{D688F0C5-AB14-0ECC-7FB9-38E77A9318F7}"/>
+              </a:ext>
+            </a:extLst>
+          </p:cNvPr>
+          <p:cNvSpPr>
+            <a:spLocks noGrp="1"/>
+          </p:cNvSpPr>
+          <p:nvPr>
+            <p:ph idx="1"/>
+          </p:nvPr>
+        </p:nvSpPr>
+        <p:spPr/>
+        <p:txBody>
+          <a:bodyPr/>
+          <a:lstStyle/>
+          <a:p>
+            <a:r>
+              <a:rPr lang="de-DE" sz="1800" dirty="0">
+                <a:effectLst/>
+                <a:latin typeface="Calibri" panose="020F0502020204030204" pitchFamily="34" charset="0"/>
+                <a:ea typeface="Aptos" panose="020B0004020202020204" pitchFamily="34" charset="0"/>
+              </a:rPr>
+              <a:t>Mit Blick auf die bald anstehenden Jahresgespräche bzw. Kooperations- und Fördergespräche bitte ich euch folgendes vorzubereiten: </a:t>
+            </a:r>
+            <a:endParaRPr lang="en-US" sz="1800" dirty="0">
+              <a:effectLst/>
+              <a:latin typeface="Calibri" panose="020F0502020204030204" pitchFamily="34" charset="0"/>
+              <a:ea typeface="Aptos" panose="020B0004020202020204" pitchFamily="34" charset="0"/>
+            </a:endParaRPr>
+          </a:p>
+          <a:p>
+            <a:pPr marL="342900" lvl="0" indent="-342900">
+              <a:buFont typeface="+mj-lt"/>
+              <a:buAutoNum type="arabicPeriod"/>
+            </a:pPr>
+            <a:r>
+              <a:rPr lang="de-DE" sz="1800" dirty="0">
+                <a:effectLst/>
+                <a:latin typeface="Calibri" panose="020F0502020204030204" pitchFamily="34" charset="0"/>
+                <a:ea typeface="Times New Roman" panose="02020603050405020304" pitchFamily="18" charset="0"/>
+              </a:rPr>
+              <a:t>Eine kurze Präsentation 4-5 Folien bezüglich eurer wissenschaftlichen Arbeiten und möglichen Promotionsinhalte. </a:t>
+            </a:r>
+            <a:endParaRPr lang="en-US" sz="1800" dirty="0">
+              <a:effectLst/>
+              <a:latin typeface="Calibri" panose="020F0502020204030204" pitchFamily="34" charset="0"/>
+              <a:ea typeface="Aptos" panose="020B0004020202020204" pitchFamily="34" charset="0"/>
+            </a:endParaRPr>
+          </a:p>
+          <a:p>
+            <a:pPr marL="342900" lvl="0" indent="-342900">
+              <a:buFont typeface="+mj-lt"/>
+              <a:buAutoNum type="arabicPeriod"/>
+            </a:pPr>
+            <a:r>
+              <a:rPr lang="de-DE" sz="1800" dirty="0">
+                <a:effectLst/>
+                <a:latin typeface="Calibri" panose="020F0502020204030204" pitchFamily="34" charset="0"/>
+                <a:ea typeface="Times New Roman" panose="02020603050405020304" pitchFamily="18" charset="0"/>
+              </a:rPr>
+              <a:t>Ergänzt dazu gerne eine Folie mit euren derzeitigen Aufgaben.</a:t>
+            </a:r>
+            <a:endParaRPr lang="en-US" sz="1800" dirty="0">
+              <a:effectLst/>
+              <a:latin typeface="Calibri" panose="020F0502020204030204" pitchFamily="34" charset="0"/>
+              <a:ea typeface="Aptos" panose="020B0004020202020204" pitchFamily="34" charset="0"/>
+            </a:endParaRPr>
+          </a:p>
+          <a:p>
+            <a:pPr marL="342900" lvl="0" indent="-342900">
+              <a:buFont typeface="+mj-lt"/>
+              <a:buAutoNum type="arabicPeriod"/>
+            </a:pPr>
+            <a:r>
+              <a:rPr lang="de-DE" sz="1800" dirty="0">
+                <a:effectLst/>
+                <a:latin typeface="Calibri" panose="020F0502020204030204" pitchFamily="34" charset="0"/>
+                <a:ea typeface="Times New Roman" panose="02020603050405020304" pitchFamily="18" charset="0"/>
+              </a:rPr>
+              <a:t>Ergänzt dazu gerne eine weitere Folie mit euren Interessen und ggf. (persönlichen) fachlichen Fortbildungswünschen – sodass wir das dann diskutieren können. </a:t>
+            </a:r>
+            <a:endParaRPr lang="en-US" sz="1800" dirty="0">
+              <a:effectLst/>
+              <a:latin typeface="Calibri" panose="020F0502020204030204" pitchFamily="34" charset="0"/>
+              <a:ea typeface="Aptos" panose="020B0004020202020204" pitchFamily="34" charset="0"/>
+            </a:endParaRPr>
+          </a:p>
+          <a:p>
+            <a:pPr marL="342900" lvl="0" indent="-342900">
+              <a:buFont typeface="+mj-lt"/>
+              <a:buAutoNum type="arabicPeriod"/>
+            </a:pPr>
+            <a:r>
+              <a:rPr lang="de-DE" sz="1800" dirty="0">
+                <a:effectLst/>
+                <a:latin typeface="Calibri" panose="020F0502020204030204" pitchFamily="34" charset="0"/>
+                <a:ea typeface="Times New Roman" panose="02020603050405020304" pitchFamily="18" charset="0"/>
+              </a:rPr>
+              <a:t>Anbei findet ihr auch noch ein paar hilfreiche Fragen, die ihr euch selbst stellen könnt – es kann aber auch sein, dass die ein oder anderen Fragen nicht ganz auf eure Tätigkeit oder Rolle am LEE passt. </a:t>
+            </a:r>
+            <a:endParaRPr lang="en-US" sz="1800" dirty="0">
+              <a:effectLst/>
+              <a:latin typeface="Calibri" panose="020F0502020204030204" pitchFamily="34" charset="0"/>
+              <a:ea typeface="Aptos" panose="020B0004020202020204" pitchFamily="34" charset="0"/>
+            </a:endParaRPr>
+          </a:p>
+          <a:p>
+            <a:pPr marL="342900" lvl="0" indent="-342900">
+              <a:buFont typeface="+mj-lt"/>
+              <a:buAutoNum type="arabicPeriod"/>
+            </a:pPr>
+            <a:r>
+              <a:rPr lang="de-DE" sz="1800" dirty="0">
+                <a:effectLst/>
+                <a:latin typeface="Calibri" panose="020F0502020204030204" pitchFamily="34" charset="0"/>
+                <a:ea typeface="Times New Roman" panose="02020603050405020304" pitchFamily="18" charset="0"/>
+              </a:rPr>
+              <a:t>Sollte es euer </a:t>
+            </a:r>
+            <a:r>
+              <a:rPr lang="de-DE" sz="1800" b="1" dirty="0">
+                <a:effectLst/>
+                <a:latin typeface="Calibri" panose="020F0502020204030204" pitchFamily="34" charset="0"/>
+                <a:ea typeface="Times New Roman" panose="02020603050405020304" pitchFamily="18" charset="0"/>
+              </a:rPr>
+              <a:t>erstes Jahresgespräch</a:t>
+            </a:r>
+            <a:r>
+              <a:rPr lang="de-DE" sz="1800" dirty="0">
+                <a:effectLst/>
+                <a:latin typeface="Calibri" panose="020F0502020204030204" pitchFamily="34" charset="0"/>
+                <a:ea typeface="Times New Roman" panose="02020603050405020304" pitchFamily="18" charset="0"/>
+              </a:rPr>
+              <a:t> sein, dann </a:t>
+            </a:r>
+            <a:r>
+              <a:rPr lang="de-DE" sz="1800" b="1" dirty="0">
+                <a:effectLst/>
+                <a:latin typeface="Calibri" panose="020F0502020204030204" pitchFamily="34" charset="0"/>
+                <a:ea typeface="Times New Roman" panose="02020603050405020304" pitchFamily="18" charset="0"/>
+              </a:rPr>
+              <a:t>bitte</a:t>
+            </a:r>
+            <a:r>
+              <a:rPr lang="de-DE" sz="1800" dirty="0">
+                <a:effectLst/>
+                <a:latin typeface="Calibri" panose="020F0502020204030204" pitchFamily="34" charset="0"/>
+                <a:ea typeface="Times New Roman" panose="02020603050405020304" pitchFamily="18" charset="0"/>
+              </a:rPr>
+              <a:t> ich </a:t>
+            </a:r>
+            <a:r>
+              <a:rPr lang="de-DE" sz="1800" b="1" dirty="0">
+                <a:effectLst/>
+                <a:latin typeface="Calibri" panose="020F0502020204030204" pitchFamily="34" charset="0"/>
+                <a:ea typeface="Times New Roman" panose="02020603050405020304" pitchFamily="18" charset="0"/>
+              </a:rPr>
+              <a:t>euch auch den Feedbackbogen</a:t>
+            </a:r>
+            <a:r>
+              <a:rPr lang="de-DE" sz="1800" dirty="0">
+                <a:effectLst/>
+                <a:latin typeface="Calibri" panose="020F0502020204030204" pitchFamily="34" charset="0"/>
+                <a:ea typeface="Times New Roman" panose="02020603050405020304" pitchFamily="18" charset="0"/>
+              </a:rPr>
+              <a:t> einmal für euch auszufüllen. Viele Dinge sind auch ein wenig redundant zu Punkt 4, was aber nicht schlimm ist. </a:t>
+            </a:r>
+            <a:endParaRPr lang="en-US" sz="1800" dirty="0">
+              <a:effectLst/>
+              <a:latin typeface="Calibri" panose="020F0502020204030204" pitchFamily="34" charset="0"/>
+              <a:ea typeface="Aptos" panose="020B0004020202020204" pitchFamily="34" charset="0"/>
+            </a:endParaRPr>
+          </a:p>
+          <a:p>
+            <a:endParaRPr lang="en-US" dirty="0"/>
+          </a:p>
+        </p:txBody>
+      </p:sp>
+    </p:spTree>
+    <p:extLst>
+      <p:ext uri="{BB962C8B-B14F-4D97-AF65-F5344CB8AC3E}">
+        <p14:creationId xmlns:p14="http://schemas.microsoft.com/office/powerpoint/2010/main" val="3735795772"/>
+      </p:ext>
+    </p:extLst>
+  </p:cSld>
+  <p:clrMapOvr>
+    <a:masterClrMapping/>
+  </p:clrMapOvr>
+</p:sld>
+</file>
+
+<file path=ppt/slides/slide3.xml><?xml version="1.0" encoding="utf-8"?>
+<p:sld xmlns:a="http://schemas.openxmlformats.org/drawingml/2006/main" xmlns:r="http://schemas.openxmlformats.org/officeDocument/2006/relationships" xmlns:p="http://schemas.openxmlformats.org/presentationml/2006/main">
+  <p:cSld>
+    <p:spTree>
+      <p:nvGrpSpPr>
+        <p:cNvPr id="1" name=""/>
+        <p:cNvGrpSpPr/>
+        <p:nvPr/>
+      </p:nvGrpSpPr>
+      <p:grpSpPr>
+        <a:xfrm>
+          <a:off x="0" y="0"/>
+          <a:ext cx="0" cy="0"/>
+          <a:chOff x="0" y="0"/>
+          <a:chExt cx="0" cy="0"/>
+        </a:xfrm>
+      </p:grpSpPr>
+      <p:pic>
+        <p:nvPicPr>
+          <p:cNvPr id="14" name="Grafik 13">
+            <a:extLst>
+              <a:ext uri="{FF2B5EF4-FFF2-40B4-BE49-F238E27FC236}">
+                <a16:creationId xmlns:a16="http://schemas.microsoft.com/office/drawing/2014/main" id="{E2368AB2-796A-A960-BB1A-B53475D3D901}"/>
+              </a:ext>
+            </a:extLst>
+          </p:cNvPr>
+          <p:cNvPicPr>
+            <a:picLocks noChangeAspect="1"/>
+          </p:cNvPicPr>
+          <p:nvPr/>
+        </p:nvPicPr>
+        <p:blipFill>
+          <a:blip r:embed="rId2"/>
+          <a:srcRect b="5691"/>
+          <a:stretch/>
+        </p:blipFill>
+        <p:spPr>
+          <a:xfrm>
+            <a:off x="1430400" y="5074033"/>
+            <a:ext cx="2683503" cy="1747984"/>
+          </a:xfrm>
+          <a:prstGeom prst="rect">
+            <a:avLst/>
+          </a:prstGeom>
+        </p:spPr>
+      </p:pic>
+      <p:pic>
+        <p:nvPicPr>
+          <p:cNvPr id="8" name="Grafik 7">
+            <a:extLst>
+              <a:ext uri="{FF2B5EF4-FFF2-40B4-BE49-F238E27FC236}">
+                <a16:creationId xmlns:a16="http://schemas.microsoft.com/office/drawing/2014/main" id="{BBA5B53D-9906-AA2F-05F4-6A931A1CC25E}"/>
+              </a:ext>
+            </a:extLst>
+          </p:cNvPr>
+          <p:cNvPicPr>
+            <a:picLocks noChangeAspect="1"/>
+          </p:cNvPicPr>
+          <p:nvPr/>
+        </p:nvPicPr>
+        <p:blipFill>
+          <a:blip r:embed="rId3"/>
+          <a:stretch>
+            <a:fillRect/>
+          </a:stretch>
+        </p:blipFill>
+        <p:spPr>
+          <a:xfrm>
+            <a:off x="4455905" y="2048094"/>
+            <a:ext cx="2080041" cy="3228976"/>
+          </a:xfrm>
+          <a:prstGeom prst="rect">
+            <a:avLst/>
+          </a:prstGeom>
+        </p:spPr>
+      </p:pic>
+      <p:sp>
+        <p:nvSpPr>
+          <p:cNvPr id="2" name="Titel 1">
+            <a:extLst>
+              <a:ext uri="{FF2B5EF4-FFF2-40B4-BE49-F238E27FC236}">
+                <a16:creationId xmlns:a16="http://schemas.microsoft.com/office/drawing/2014/main" id="{0B386DDC-E429-7434-513B-9F8F98550C2D}"/>
+              </a:ext>
+            </a:extLst>
+          </p:cNvPr>
+          <p:cNvSpPr>
+            <a:spLocks noGrp="1"/>
+          </p:cNvSpPr>
+          <p:nvPr>
+            <p:ph type="title"/>
+          </p:nvPr>
+        </p:nvSpPr>
+        <p:spPr/>
+        <p:txBody>
+          <a:bodyPr/>
+          <a:lstStyle/>
+          <a:p>
+            <a:r>
+              <a:rPr lang="de-DE" dirty="0"/>
+              <a:t>Wissenschaftliche Arbeit</a:t>
+            </a:r>
+            <a:endParaRPr lang="en-US" dirty="0"/>
+          </a:p>
+        </p:txBody>
+      </p:sp>
+      <p:sp>
+        <p:nvSpPr>
+          <p:cNvPr id="4" name="Textfeld 3">
+            <a:extLst>
+              <a:ext uri="{FF2B5EF4-FFF2-40B4-BE49-F238E27FC236}">
+                <a16:creationId xmlns:a16="http://schemas.microsoft.com/office/drawing/2014/main" id="{0143C59D-5997-6E32-7B5C-E2605615C3C2}"/>
+              </a:ext>
+            </a:extLst>
+          </p:cNvPr>
+          <p:cNvSpPr txBox="1"/>
+          <p:nvPr/>
+        </p:nvSpPr>
+        <p:spPr>
+          <a:xfrm>
+            <a:off x="742948" y="1625526"/>
+            <a:ext cx="8086725" cy="646331"/>
+          </a:xfrm>
+          <a:prstGeom prst="rect">
+            <a:avLst/>
+          </a:prstGeom>
+          <a:noFill/>
+        </p:spPr>
+        <p:txBody>
+          <a:bodyPr wrap="square" rtlCol="0">
+            <a:spAutoFit/>
+          </a:bodyPr>
+          <a:lstStyle/>
+          <a:p>
+            <a:r>
+              <a:rPr lang="de-DE" dirty="0"/>
+              <a:t>Primäre Aufgabe: Das Projekt </a:t>
+            </a:r>
+            <a:r>
+              <a:rPr lang="de-DE" i="1" dirty="0" err="1"/>
+              <a:t>HyDi.KWK</a:t>
+            </a:r>
+            <a:r>
+              <a:rPr lang="de-DE" dirty="0"/>
+              <a:t> in leitender Position bearbeiten</a:t>
+            </a:r>
+          </a:p>
+          <a:p>
+            <a:pPr marL="285750" indent="-285750">
+              <a:buFont typeface="Wingdings" panose="05000000000000000000" pitchFamily="2" charset="2"/>
+              <a:buChar char="n"/>
+            </a:pPr>
+            <a:endParaRPr lang="en-US" dirty="0"/>
+          </a:p>
+        </p:txBody>
+      </p:sp>
+      <p:sp>
+        <p:nvSpPr>
+          <p:cNvPr id="5" name="Textfeld 4">
+            <a:extLst>
+              <a:ext uri="{FF2B5EF4-FFF2-40B4-BE49-F238E27FC236}">
+                <a16:creationId xmlns:a16="http://schemas.microsoft.com/office/drawing/2014/main" id="{7555DB51-D9D9-1FF5-4F62-3EC675A65037}"/>
+              </a:ext>
+            </a:extLst>
+          </p:cNvPr>
+          <p:cNvSpPr txBox="1"/>
+          <p:nvPr/>
+        </p:nvSpPr>
+        <p:spPr>
+          <a:xfrm>
+            <a:off x="742948" y="2337019"/>
+            <a:ext cx="3667127" cy="3000821"/>
+          </a:xfrm>
+          <a:prstGeom prst="rect">
+            <a:avLst/>
+          </a:prstGeom>
+          <a:noFill/>
+        </p:spPr>
+        <p:txBody>
+          <a:bodyPr wrap="square" rtlCol="0">
+            <a:spAutoFit/>
+          </a:bodyPr>
+          <a:lstStyle/>
+          <a:p>
+            <a:r>
+              <a:rPr lang="de-DE" b="1" dirty="0"/>
+              <a:t>Aufbau der Forschungsinfrastruktur</a:t>
+            </a:r>
+          </a:p>
+          <a:p>
+            <a:pPr marL="285750" indent="-285750">
+              <a:lnSpc>
+                <a:spcPct val="150000"/>
+              </a:lnSpc>
+              <a:buFont typeface="Wingdings" panose="05000000000000000000" pitchFamily="2" charset="2"/>
+              <a:buChar char="n"/>
+            </a:pPr>
+            <a:r>
+              <a:rPr lang="de-DE" dirty="0"/>
+              <a:t>SOC-Testanlage</a:t>
+            </a:r>
+          </a:p>
+          <a:p>
+            <a:pPr marL="742950" lvl="1" indent="-285750">
+              <a:lnSpc>
+                <a:spcPct val="150000"/>
+              </a:lnSpc>
+              <a:buFont typeface="Wingdings" panose="05000000000000000000" pitchFamily="2" charset="2"/>
+              <a:buChar char="n"/>
+            </a:pPr>
+            <a:r>
+              <a:rPr lang="de-DE" dirty="0" err="1"/>
+              <a:t>Stackerweiterung</a:t>
+            </a:r>
+            <a:endParaRPr lang="de-DE" dirty="0"/>
+          </a:p>
+          <a:p>
+            <a:pPr marL="285750" indent="-285750">
+              <a:lnSpc>
+                <a:spcPct val="150000"/>
+              </a:lnSpc>
+              <a:buFont typeface="Wingdings" panose="05000000000000000000" pitchFamily="2" charset="2"/>
+              <a:buChar char="n"/>
+            </a:pPr>
+            <a:r>
+              <a:rPr lang="de-DE" dirty="0"/>
+              <a:t>Gasanalytik</a:t>
+            </a:r>
+          </a:p>
+          <a:p>
+            <a:pPr marL="285750" indent="-285750">
+              <a:lnSpc>
+                <a:spcPct val="150000"/>
+              </a:lnSpc>
+              <a:buFont typeface="Wingdings" panose="05000000000000000000" pitchFamily="2" charset="2"/>
+              <a:buChar char="n"/>
+            </a:pPr>
+            <a:r>
+              <a:rPr lang="de-DE" dirty="0"/>
+              <a:t>Optische Analytik</a:t>
+            </a:r>
+          </a:p>
+          <a:p>
+            <a:pPr marL="285750" indent="-285750">
+              <a:lnSpc>
+                <a:spcPct val="150000"/>
+              </a:lnSpc>
+              <a:buFont typeface="Wingdings" panose="05000000000000000000" pitchFamily="2" charset="2"/>
+              <a:buChar char="n"/>
+            </a:pPr>
+            <a:r>
+              <a:rPr lang="de-DE" dirty="0"/>
+              <a:t>Gasversorgungsinfrastruktur</a:t>
+            </a:r>
+          </a:p>
+          <a:p>
+            <a:pPr marL="285750" indent="-285750">
+              <a:buFont typeface="Wingdings" panose="05000000000000000000" pitchFamily="2" charset="2"/>
+              <a:buChar char="n"/>
+            </a:pPr>
+            <a:endParaRPr lang="en-US" dirty="0"/>
+          </a:p>
+        </p:txBody>
+      </p:sp>
+      <p:sp>
+        <p:nvSpPr>
+          <p:cNvPr id="6" name="Textfeld 5">
+            <a:extLst>
+              <a:ext uri="{FF2B5EF4-FFF2-40B4-BE49-F238E27FC236}">
+                <a16:creationId xmlns:a16="http://schemas.microsoft.com/office/drawing/2014/main" id="{A0009494-778D-15A2-7EE1-5289B3AB61B2}"/>
+              </a:ext>
+            </a:extLst>
+          </p:cNvPr>
+          <p:cNvSpPr txBox="1"/>
+          <p:nvPr/>
+        </p:nvSpPr>
+        <p:spPr>
+          <a:xfrm>
+            <a:off x="6696075" y="2262187"/>
+            <a:ext cx="4662487" cy="3554819"/>
+          </a:xfrm>
+          <a:prstGeom prst="rect">
+            <a:avLst/>
+          </a:prstGeom>
+          <a:noFill/>
+        </p:spPr>
+        <p:txBody>
+          <a:bodyPr wrap="square" rtlCol="0">
+            <a:spAutoFit/>
+          </a:bodyPr>
+          <a:lstStyle/>
+          <a:p>
+            <a:r>
+              <a:rPr lang="de-DE" b="1" dirty="0"/>
+              <a:t>Modellierung der SOFC</a:t>
+            </a:r>
+          </a:p>
+          <a:p>
+            <a:pPr marL="285750" indent="-285750">
+              <a:lnSpc>
+                <a:spcPct val="150000"/>
+              </a:lnSpc>
+              <a:buFont typeface="Wingdings" panose="05000000000000000000" pitchFamily="2" charset="2"/>
+              <a:buChar char="n"/>
+            </a:pPr>
+            <a:r>
+              <a:rPr lang="de-DE" dirty="0"/>
+              <a:t>SOC-Testanlage</a:t>
+            </a:r>
+          </a:p>
+          <a:p>
+            <a:pPr marL="742950" lvl="1" indent="-285750">
+              <a:lnSpc>
+                <a:spcPct val="150000"/>
+              </a:lnSpc>
+              <a:buFont typeface="Wingdings" panose="05000000000000000000" pitchFamily="2" charset="2"/>
+              <a:buChar char="n"/>
+            </a:pPr>
+            <a:r>
+              <a:rPr lang="de-DE" dirty="0"/>
+              <a:t>Gasanalytik/Optische Analytik/</a:t>
+            </a:r>
+            <a:r>
+              <a:rPr lang="de-DE" dirty="0" err="1"/>
+              <a:t>Stackerweiterung</a:t>
+            </a:r>
+            <a:endParaRPr lang="de-DE" dirty="0"/>
+          </a:p>
+          <a:p>
+            <a:pPr marL="285750" indent="-285750">
+              <a:lnSpc>
+                <a:spcPct val="150000"/>
+              </a:lnSpc>
+              <a:buFont typeface="Wingdings" panose="05000000000000000000" pitchFamily="2" charset="2"/>
+              <a:buChar char="n"/>
+            </a:pPr>
+            <a:r>
+              <a:rPr lang="de-DE" dirty="0"/>
+              <a:t>Gasversorgungsinfrastruktur</a:t>
+            </a:r>
+          </a:p>
+          <a:p>
+            <a:pPr marL="742950" lvl="1" indent="-285750">
+              <a:lnSpc>
+                <a:spcPct val="150000"/>
+              </a:lnSpc>
+              <a:buFont typeface="Wingdings" panose="05000000000000000000" pitchFamily="2" charset="2"/>
+              <a:buChar char="n"/>
+            </a:pPr>
+            <a:r>
+              <a:rPr lang="de-DE" dirty="0"/>
+              <a:t>In enger Abstimmung mit Friedrich/Robert, für Gewinnbringung beim Lehrstuhl</a:t>
+            </a:r>
+          </a:p>
+          <a:p>
+            <a:pPr marL="285750" indent="-285750">
+              <a:buFont typeface="Wingdings" panose="05000000000000000000" pitchFamily="2" charset="2"/>
+              <a:buChar char="n"/>
+            </a:pPr>
+            <a:endParaRPr lang="en-US" dirty="0"/>
+          </a:p>
+        </p:txBody>
+      </p:sp>
+      <p:pic>
+        <p:nvPicPr>
+          <p:cNvPr id="10" name="Grafik 9">
+            <a:extLst>
+              <a:ext uri="{FF2B5EF4-FFF2-40B4-BE49-F238E27FC236}">
+                <a16:creationId xmlns:a16="http://schemas.microsoft.com/office/drawing/2014/main" id="{52071935-123C-A5DE-106C-2AF5CB856B70}"/>
+              </a:ext>
+            </a:extLst>
+          </p:cNvPr>
+          <p:cNvPicPr>
+            <a:picLocks noChangeAspect="1"/>
+          </p:cNvPicPr>
+          <p:nvPr/>
+        </p:nvPicPr>
+        <p:blipFill>
+          <a:blip r:embed="rId4"/>
+          <a:stretch>
+            <a:fillRect/>
+          </a:stretch>
+        </p:blipFill>
+        <p:spPr>
+          <a:xfrm>
+            <a:off x="4062267" y="5277070"/>
+            <a:ext cx="2867316" cy="1544947"/>
+          </a:xfrm>
+          <a:prstGeom prst="rect">
+            <a:avLst/>
+          </a:prstGeom>
+        </p:spPr>
+      </p:pic>
+      <p:pic>
+        <p:nvPicPr>
+          <p:cNvPr id="12" name="Grafik 11">
+            <a:extLst>
+              <a:ext uri="{FF2B5EF4-FFF2-40B4-BE49-F238E27FC236}">
+                <a16:creationId xmlns:a16="http://schemas.microsoft.com/office/drawing/2014/main" id="{EC07003A-1D4D-083E-7705-01F919DB803F}"/>
+              </a:ext>
+            </a:extLst>
+          </p:cNvPr>
+          <p:cNvPicPr>
+            <a:picLocks noChangeAspect="1"/>
+          </p:cNvPicPr>
+          <p:nvPr/>
+        </p:nvPicPr>
+        <p:blipFill>
+          <a:blip r:embed="rId5"/>
+          <a:stretch>
+            <a:fillRect/>
+          </a:stretch>
+        </p:blipFill>
+        <p:spPr>
+          <a:xfrm>
+            <a:off x="7219950" y="5188610"/>
+            <a:ext cx="2479773" cy="1669390"/>
+          </a:xfrm>
+          <a:prstGeom prst="rect">
+            <a:avLst/>
+          </a:prstGeom>
+        </p:spPr>
+      </p:pic>
+    </p:spTree>
+    <p:extLst>
+      <p:ext uri="{BB962C8B-B14F-4D97-AF65-F5344CB8AC3E}">
+        <p14:creationId xmlns:p14="http://schemas.microsoft.com/office/powerpoint/2010/main" val="2046204047"/>
+      </p:ext>
+    </p:extLst>
+  </p:cSld>
+  <p:clrMapOvr>
+    <a:masterClrMapping/>
+  </p:clrMapOvr>
+</p:sld>
+</file>
+
+<file path=ppt/slides/slide4.xml><?xml version="1.0" encoding="utf-8"?>
+<p:sld xmlns:a="http://schemas.openxmlformats.org/drawingml/2006/main" xmlns:r="http://schemas.openxmlformats.org/officeDocument/2006/relationships" xmlns:p="http://schemas.openxmlformats.org/presentationml/2006/main">
+  <p:cSld>
+    <p:spTree>
+      <p:nvGrpSpPr>
+        <p:cNvPr id="1" name=""/>
+        <p:cNvGrpSpPr/>
+        <p:nvPr/>
+      </p:nvGrpSpPr>
+      <p:grpSpPr>
+        <a:xfrm>
+          <a:off x="0" y="0"/>
+          <a:ext cx="0" cy="0"/>
+          <a:chOff x="0" y="0"/>
+          <a:chExt cx="0" cy="0"/>
+        </a:xfrm>
+      </p:grpSpPr>
+      <p:sp>
+        <p:nvSpPr>
+          <p:cNvPr id="2" name="Titel 1">
+            <a:extLst>
+              <a:ext uri="{FF2B5EF4-FFF2-40B4-BE49-F238E27FC236}">
+                <a16:creationId xmlns:a16="http://schemas.microsoft.com/office/drawing/2014/main" id="{0B386DDC-E429-7434-513B-9F8F98550C2D}"/>
+              </a:ext>
+            </a:extLst>
+          </p:cNvPr>
+          <p:cNvSpPr>
+            <a:spLocks noGrp="1"/>
+          </p:cNvSpPr>
+          <p:nvPr>
+            <p:ph type="title"/>
+          </p:nvPr>
+        </p:nvSpPr>
+        <p:spPr/>
+        <p:txBody>
+          <a:bodyPr/>
+          <a:lstStyle/>
+          <a:p>
+            <a:r>
+              <a:rPr lang="de-DE" dirty="0"/>
+              <a:t>Wissenschaftliche Arbeit</a:t>
+            </a:r>
+            <a:endParaRPr lang="en-US" dirty="0"/>
+          </a:p>
+        </p:txBody>
+      </p:sp>
+      <p:pic>
+        <p:nvPicPr>
+          <p:cNvPr id="7" name="Grafik 6">
+            <a:extLst>
+              <a:ext uri="{FF2B5EF4-FFF2-40B4-BE49-F238E27FC236}">
+                <a16:creationId xmlns:a16="http://schemas.microsoft.com/office/drawing/2014/main" id="{94FA84F8-00FA-0144-B817-7EB2EBE5C852}"/>
+              </a:ext>
+            </a:extLst>
+          </p:cNvPr>
+          <p:cNvPicPr>
+            <a:picLocks noChangeAspect="1"/>
+          </p:cNvPicPr>
+          <p:nvPr/>
+        </p:nvPicPr>
+        <p:blipFill>
+          <a:blip r:embed="rId2"/>
+          <a:stretch>
+            <a:fillRect/>
+          </a:stretch>
+        </p:blipFill>
+        <p:spPr>
+          <a:xfrm>
+            <a:off x="997526" y="1343800"/>
+            <a:ext cx="10030691" cy="4986144"/>
+          </a:xfrm>
+          <a:prstGeom prst="rect">
+            <a:avLst/>
+          </a:prstGeom>
+        </p:spPr>
+      </p:pic>
+      <p:sp>
+        <p:nvSpPr>
+          <p:cNvPr id="9" name="Rechteck 8">
+            <a:extLst>
+              <a:ext uri="{FF2B5EF4-FFF2-40B4-BE49-F238E27FC236}">
+                <a16:creationId xmlns:a16="http://schemas.microsoft.com/office/drawing/2014/main" id="{C2C21C26-E68E-D440-E0AF-33750CE16EF2}"/>
+              </a:ext>
+            </a:extLst>
+          </p:cNvPr>
+          <p:cNvSpPr/>
+          <p:nvPr/>
+        </p:nvSpPr>
+        <p:spPr>
+          <a:xfrm>
+            <a:off x="997526" y="3429000"/>
+            <a:ext cx="10030691" cy="145473"/>
+          </a:xfrm>
+          <a:prstGeom prst="rect">
+            <a:avLst/>
+          </a:prstGeom>
+          <a:noFill/>
+          <a:ln>
+            <a:solidFill>
+              <a:srgbClr val="FF0000"/>
+            </a:solidFill>
+            <a:prstDash val="solid"/>
+          </a:ln>
+        </p:spPr>
+        <p:style>
+          <a:lnRef idx="2">
+            <a:schemeClr val="accent1">
+              <a:shade val="15000"/>
+            </a:schemeClr>
+          </a:lnRef>
+          <a:fillRef idx="1">
+            <a:schemeClr val="accent1"/>
+          </a:fillRef>
+          <a:effectRef idx="0">
+            <a:schemeClr val="accent1"/>
+          </a:effectRef>
+          <a:fontRef idx="minor">
+            <a:schemeClr val="lt1"/>
+          </a:fontRef>
+        </p:style>
+        <p:txBody>
+          <a:bodyPr rtlCol="0" anchor="ctr"/>
+          <a:lstStyle/>
+          <a:p>
+            <a:pPr algn="ctr"/>
+            <a:endParaRPr lang="en-US"/>
+          </a:p>
+        </p:txBody>
+      </p:sp>
+      <p:sp>
+        <p:nvSpPr>
+          <p:cNvPr id="11" name="Rechteck 10">
+            <a:extLst>
+              <a:ext uri="{FF2B5EF4-FFF2-40B4-BE49-F238E27FC236}">
+                <a16:creationId xmlns:a16="http://schemas.microsoft.com/office/drawing/2014/main" id="{E1343FC5-C4C2-200F-B34C-6C8C349D00F0}"/>
+              </a:ext>
+            </a:extLst>
+          </p:cNvPr>
+          <p:cNvSpPr/>
+          <p:nvPr/>
+        </p:nvSpPr>
+        <p:spPr>
+          <a:xfrm>
+            <a:off x="997525" y="4301836"/>
+            <a:ext cx="10030691" cy="145473"/>
+          </a:xfrm>
+          <a:prstGeom prst="rect">
+            <a:avLst/>
+          </a:prstGeom>
+          <a:noFill/>
+          <a:ln>
+            <a:solidFill>
+              <a:srgbClr val="FF0000"/>
+            </a:solidFill>
+            <a:prstDash val="solid"/>
+          </a:ln>
+        </p:spPr>
+        <p:style>
+          <a:lnRef idx="2">
+            <a:schemeClr val="accent1">
+              <a:shade val="15000"/>
+            </a:schemeClr>
+          </a:lnRef>
+          <a:fillRef idx="1">
+            <a:schemeClr val="accent1"/>
+          </a:fillRef>
+          <a:effectRef idx="0">
+            <a:schemeClr val="accent1"/>
+          </a:effectRef>
+          <a:fontRef idx="minor">
+            <a:schemeClr val="lt1"/>
+          </a:fontRef>
+        </p:style>
+        <p:txBody>
+          <a:bodyPr rtlCol="0" anchor="ctr"/>
+          <a:lstStyle/>
+          <a:p>
+            <a:pPr algn="ctr"/>
+            <a:endParaRPr lang="en-US"/>
+          </a:p>
+        </p:txBody>
+      </p:sp>
+      <p:sp>
+        <p:nvSpPr>
+          <p:cNvPr id="13" name="Rechteck 12">
+            <a:extLst>
+              <a:ext uri="{FF2B5EF4-FFF2-40B4-BE49-F238E27FC236}">
+                <a16:creationId xmlns:a16="http://schemas.microsoft.com/office/drawing/2014/main" id="{37C32BDE-F85F-4079-BD5A-2362C630DDF1}"/>
+              </a:ext>
+            </a:extLst>
+          </p:cNvPr>
+          <p:cNvSpPr/>
+          <p:nvPr/>
+        </p:nvSpPr>
+        <p:spPr>
+          <a:xfrm>
+            <a:off x="997521" y="4578807"/>
+            <a:ext cx="10030691" cy="145473"/>
+          </a:xfrm>
+          <a:prstGeom prst="rect">
+            <a:avLst/>
+          </a:prstGeom>
+          <a:noFill/>
+          <a:ln>
+            <a:solidFill>
+              <a:srgbClr val="FF0000"/>
+            </a:solidFill>
+            <a:prstDash val="solid"/>
+          </a:ln>
+        </p:spPr>
+        <p:style>
+          <a:lnRef idx="2">
+            <a:schemeClr val="accent1">
+              <a:shade val="15000"/>
+            </a:schemeClr>
+          </a:lnRef>
+          <a:fillRef idx="1">
+            <a:schemeClr val="accent1"/>
+          </a:fillRef>
+          <a:effectRef idx="0">
+            <a:schemeClr val="accent1"/>
+          </a:effectRef>
+          <a:fontRef idx="minor">
+            <a:schemeClr val="lt1"/>
+          </a:fontRef>
+        </p:style>
+        <p:txBody>
+          <a:bodyPr rtlCol="0" anchor="ctr"/>
+          <a:lstStyle/>
+          <a:p>
+            <a:pPr algn="ctr"/>
+            <a:endParaRPr lang="en-US"/>
+          </a:p>
+        </p:txBody>
+      </p:sp>
+      <p:sp>
+        <p:nvSpPr>
+          <p:cNvPr id="15" name="Rechteck 14">
+            <a:extLst>
+              <a:ext uri="{FF2B5EF4-FFF2-40B4-BE49-F238E27FC236}">
+                <a16:creationId xmlns:a16="http://schemas.microsoft.com/office/drawing/2014/main" id="{8F12AAEE-50F9-CF28-5812-CB48A4DD7FE5}"/>
+              </a:ext>
+            </a:extLst>
+          </p:cNvPr>
+          <p:cNvSpPr/>
+          <p:nvPr/>
+        </p:nvSpPr>
+        <p:spPr>
+          <a:xfrm>
+            <a:off x="997524" y="5146724"/>
+            <a:ext cx="10030691" cy="145473"/>
+          </a:xfrm>
+          <a:prstGeom prst="rect">
+            <a:avLst/>
+          </a:prstGeom>
+          <a:noFill/>
+          <a:ln>
+            <a:solidFill>
+              <a:srgbClr val="FF0000"/>
+            </a:solidFill>
+            <a:prstDash val="solid"/>
+          </a:ln>
+        </p:spPr>
+        <p:style>
+          <a:lnRef idx="2">
+            <a:schemeClr val="accent1">
+              <a:shade val="15000"/>
+            </a:schemeClr>
+          </a:lnRef>
+          <a:fillRef idx="1">
+            <a:schemeClr val="accent1"/>
+          </a:fillRef>
+          <a:effectRef idx="0">
+            <a:schemeClr val="accent1"/>
+          </a:effectRef>
+          <a:fontRef idx="minor">
+            <a:schemeClr val="lt1"/>
+          </a:fontRef>
+        </p:style>
+        <p:txBody>
+          <a:bodyPr rtlCol="0" anchor="ctr"/>
+          <a:lstStyle/>
+          <a:p>
+            <a:pPr algn="ctr"/>
+            <a:endParaRPr lang="en-US"/>
+          </a:p>
+        </p:txBody>
+      </p:sp>
+      <p:sp>
+        <p:nvSpPr>
+          <p:cNvPr id="16" name="Rechteck 15">
+            <a:extLst>
+              <a:ext uri="{FF2B5EF4-FFF2-40B4-BE49-F238E27FC236}">
+                <a16:creationId xmlns:a16="http://schemas.microsoft.com/office/drawing/2014/main" id="{07D276D9-52DF-1FB7-3DB8-35E699073BFE}"/>
+              </a:ext>
+            </a:extLst>
+          </p:cNvPr>
+          <p:cNvSpPr/>
+          <p:nvPr/>
+        </p:nvSpPr>
+        <p:spPr>
+          <a:xfrm>
+            <a:off x="997523" y="5709766"/>
+            <a:ext cx="10030691" cy="145473"/>
+          </a:xfrm>
+          <a:prstGeom prst="rect">
+            <a:avLst/>
+          </a:prstGeom>
+          <a:noFill/>
+          <a:ln>
+            <a:solidFill>
+              <a:srgbClr val="FF0000"/>
+            </a:solidFill>
+            <a:prstDash val="solid"/>
+          </a:ln>
+        </p:spPr>
+        <p:style>
+          <a:lnRef idx="2">
+            <a:schemeClr val="accent1">
+              <a:shade val="15000"/>
+            </a:schemeClr>
+          </a:lnRef>
+          <a:fillRef idx="1">
+            <a:schemeClr val="accent1"/>
+          </a:fillRef>
+          <a:effectRef idx="0">
+            <a:schemeClr val="accent1"/>
+          </a:effectRef>
+          <a:fontRef idx="minor">
+            <a:schemeClr val="lt1"/>
+          </a:fontRef>
+        </p:style>
+        <p:txBody>
+          <a:bodyPr rtlCol="0" anchor="ctr"/>
+          <a:lstStyle/>
+          <a:p>
+            <a:pPr algn="ctr"/>
+            <a:endParaRPr lang="en-US"/>
+          </a:p>
+        </p:txBody>
+      </p:sp>
+      <p:sp>
+        <p:nvSpPr>
+          <p:cNvPr id="17" name="Rechteck 16">
+            <a:extLst>
+              <a:ext uri="{FF2B5EF4-FFF2-40B4-BE49-F238E27FC236}">
+                <a16:creationId xmlns:a16="http://schemas.microsoft.com/office/drawing/2014/main" id="{8BE648A1-9C5F-095E-CCC9-3D9B15A5748A}"/>
+              </a:ext>
+            </a:extLst>
+          </p:cNvPr>
+          <p:cNvSpPr/>
+          <p:nvPr/>
+        </p:nvSpPr>
+        <p:spPr>
+          <a:xfrm>
+            <a:off x="997522" y="6010176"/>
+            <a:ext cx="10030691" cy="145473"/>
+          </a:xfrm>
+          <a:prstGeom prst="rect">
+            <a:avLst/>
+          </a:prstGeom>
+          <a:noFill/>
+          <a:ln>
+            <a:solidFill>
+              <a:srgbClr val="FF0000"/>
+            </a:solidFill>
+            <a:prstDash val="solid"/>
+          </a:ln>
+        </p:spPr>
+        <p:style>
+          <a:lnRef idx="2">
+            <a:schemeClr val="accent1">
+              <a:shade val="15000"/>
+            </a:schemeClr>
+          </a:lnRef>
+          <a:fillRef idx="1">
+            <a:schemeClr val="accent1"/>
+          </a:fillRef>
+          <a:effectRef idx="0">
+            <a:schemeClr val="accent1"/>
+          </a:effectRef>
+          <a:fontRef idx="minor">
+            <a:schemeClr val="lt1"/>
+          </a:fontRef>
+        </p:style>
+        <p:txBody>
+          <a:bodyPr rtlCol="0" anchor="ctr"/>
+          <a:lstStyle/>
+          <a:p>
+            <a:pPr algn="ctr"/>
+            <a:endParaRPr lang="en-US"/>
+          </a:p>
+        </p:txBody>
+      </p:sp>
+      <p:cxnSp>
+        <p:nvCxnSpPr>
+          <p:cNvPr id="19" name="Gerade Verbindung mit Pfeil 18">
+            <a:extLst>
+              <a:ext uri="{FF2B5EF4-FFF2-40B4-BE49-F238E27FC236}">
+                <a16:creationId xmlns:a16="http://schemas.microsoft.com/office/drawing/2014/main" id="{228281D3-1F8A-4977-A605-2EC470014BE3}"/>
+              </a:ext>
+            </a:extLst>
+          </p:cNvPr>
+          <p:cNvCxnSpPr>
+            <a:cxnSpLocks/>
+          </p:cNvCxnSpPr>
+          <p:nvPr/>
+        </p:nvCxnSpPr>
+        <p:spPr>
+          <a:xfrm>
+            <a:off x="637521" y="3501737"/>
+            <a:ext cx="360000" cy="0"/>
+          </a:xfrm>
+          <a:prstGeom prst="straightConnector1">
+            <a:avLst/>
+          </a:prstGeom>
+          <a:ln>
+            <a:solidFill>
+              <a:srgbClr val="FF0000"/>
+            </a:solidFill>
+            <a:tailEnd type="triangle"/>
+          </a:ln>
+        </p:spPr>
+        <p:style>
+          <a:lnRef idx="2">
+            <a:schemeClr val="accent1"/>
+          </a:lnRef>
+          <a:fillRef idx="0">
+            <a:schemeClr val="accent1"/>
+          </a:fillRef>
+          <a:effectRef idx="1">
+            <a:schemeClr val="accent1"/>
+          </a:effectRef>
+          <a:fontRef idx="minor">
+            <a:schemeClr val="tx1"/>
+          </a:fontRef>
+        </p:style>
+      </p:cxnSp>
+      <p:cxnSp>
+        <p:nvCxnSpPr>
+          <p:cNvPr id="21" name="Gerade Verbindung mit Pfeil 20">
+            <a:extLst>
+              <a:ext uri="{FF2B5EF4-FFF2-40B4-BE49-F238E27FC236}">
+                <a16:creationId xmlns:a16="http://schemas.microsoft.com/office/drawing/2014/main" id="{B630D71B-5B0B-9253-8979-C0E83874761B}"/>
+              </a:ext>
+            </a:extLst>
+          </p:cNvPr>
+          <p:cNvCxnSpPr>
+            <a:cxnSpLocks/>
+          </p:cNvCxnSpPr>
+          <p:nvPr/>
+        </p:nvCxnSpPr>
+        <p:spPr>
+          <a:xfrm>
+            <a:off x="637521" y="4374573"/>
+            <a:ext cx="360000" cy="0"/>
+          </a:xfrm>
+          <a:prstGeom prst="straightConnector1">
+            <a:avLst/>
+          </a:prstGeom>
+          <a:ln>
+            <a:solidFill>
+              <a:srgbClr val="FF0000"/>
+            </a:solidFill>
+            <a:tailEnd type="triangle"/>
+          </a:ln>
+        </p:spPr>
+        <p:style>
+          <a:lnRef idx="2">
+            <a:schemeClr val="accent1"/>
+          </a:lnRef>
+          <a:fillRef idx="0">
+            <a:schemeClr val="accent1"/>
+          </a:fillRef>
+          <a:effectRef idx="1">
+            <a:schemeClr val="accent1"/>
+          </a:effectRef>
+          <a:fontRef idx="minor">
+            <a:schemeClr val="tx1"/>
+          </a:fontRef>
+        </p:style>
+      </p:cxnSp>
+      <p:cxnSp>
+        <p:nvCxnSpPr>
+          <p:cNvPr id="24" name="Gerade Verbindung mit Pfeil 23">
+            <a:extLst>
+              <a:ext uri="{FF2B5EF4-FFF2-40B4-BE49-F238E27FC236}">
+                <a16:creationId xmlns:a16="http://schemas.microsoft.com/office/drawing/2014/main" id="{DAF7073A-C666-8C36-A1A3-FFB5D493C0C7}"/>
+              </a:ext>
+            </a:extLst>
+          </p:cNvPr>
+          <p:cNvCxnSpPr>
+            <a:cxnSpLocks/>
+          </p:cNvCxnSpPr>
+          <p:nvPr/>
+        </p:nvCxnSpPr>
+        <p:spPr>
+          <a:xfrm>
+            <a:off x="637521" y="5219461"/>
+            <a:ext cx="360000" cy="0"/>
+          </a:xfrm>
+          <a:prstGeom prst="straightConnector1">
+            <a:avLst/>
+          </a:prstGeom>
+          <a:ln>
+            <a:solidFill>
+              <a:srgbClr val="FF0000"/>
+            </a:solidFill>
+            <a:tailEnd type="triangle"/>
+          </a:ln>
+        </p:spPr>
+        <p:style>
+          <a:lnRef idx="2">
+            <a:schemeClr val="accent1"/>
+          </a:lnRef>
+          <a:fillRef idx="0">
+            <a:schemeClr val="accent1"/>
+          </a:fillRef>
+          <a:effectRef idx="1">
+            <a:schemeClr val="accent1"/>
+          </a:effectRef>
+          <a:fontRef idx="minor">
+            <a:schemeClr val="tx1"/>
+          </a:fontRef>
+        </p:style>
+      </p:cxnSp>
+      <p:cxnSp>
+        <p:nvCxnSpPr>
+          <p:cNvPr id="27" name="Gerade Verbindung mit Pfeil 26">
+            <a:extLst>
+              <a:ext uri="{FF2B5EF4-FFF2-40B4-BE49-F238E27FC236}">
+                <a16:creationId xmlns:a16="http://schemas.microsoft.com/office/drawing/2014/main" id="{88D26956-2192-00A5-FF05-9941A5320A69}"/>
+              </a:ext>
+            </a:extLst>
+          </p:cNvPr>
+          <p:cNvCxnSpPr>
+            <a:cxnSpLocks/>
+            <a:endCxn id="16" idx="1"/>
+          </p:cNvCxnSpPr>
+          <p:nvPr/>
+        </p:nvCxnSpPr>
+        <p:spPr>
+          <a:xfrm>
+            <a:off x="637521" y="5782503"/>
+            <a:ext cx="360002" cy="0"/>
+          </a:xfrm>
+          <a:prstGeom prst="straightConnector1">
+            <a:avLst/>
+          </a:prstGeom>
+          <a:ln>
+            <a:solidFill>
+              <a:srgbClr val="FF0000"/>
+            </a:solidFill>
+            <a:tailEnd type="triangle"/>
+          </a:ln>
+        </p:spPr>
+        <p:style>
+          <a:lnRef idx="2">
+            <a:schemeClr val="accent1"/>
+          </a:lnRef>
+          <a:fillRef idx="0">
+            <a:schemeClr val="accent1"/>
+          </a:fillRef>
+          <a:effectRef idx="1">
+            <a:schemeClr val="accent1"/>
+          </a:effectRef>
+          <a:fontRef idx="minor">
+            <a:schemeClr val="tx1"/>
+          </a:fontRef>
+        </p:style>
+      </p:cxnSp>
+      <p:cxnSp>
+        <p:nvCxnSpPr>
+          <p:cNvPr id="30" name="Gerade Verbindung mit Pfeil 29">
+            <a:extLst>
+              <a:ext uri="{FF2B5EF4-FFF2-40B4-BE49-F238E27FC236}">
+                <a16:creationId xmlns:a16="http://schemas.microsoft.com/office/drawing/2014/main" id="{29CDE381-8634-8C1E-C12C-7A85E1C145E2}"/>
+              </a:ext>
+            </a:extLst>
+          </p:cNvPr>
+          <p:cNvCxnSpPr>
+            <a:cxnSpLocks/>
+          </p:cNvCxnSpPr>
+          <p:nvPr/>
+        </p:nvCxnSpPr>
+        <p:spPr>
+          <a:xfrm>
+            <a:off x="637521" y="6082913"/>
+            <a:ext cx="360000" cy="0"/>
+          </a:xfrm>
+          <a:prstGeom prst="straightConnector1">
+            <a:avLst/>
+          </a:prstGeom>
+          <a:ln>
+            <a:solidFill>
+              <a:srgbClr val="FF0000"/>
+            </a:solidFill>
+            <a:tailEnd type="triangle"/>
+          </a:ln>
+        </p:spPr>
+        <p:style>
+          <a:lnRef idx="2">
+            <a:schemeClr val="accent1"/>
+          </a:lnRef>
+          <a:fillRef idx="0">
+            <a:schemeClr val="accent1"/>
+          </a:fillRef>
+          <a:effectRef idx="1">
+            <a:schemeClr val="accent1"/>
+          </a:effectRef>
+          <a:fontRef idx="minor">
+            <a:schemeClr val="tx1"/>
+          </a:fontRef>
+        </p:style>
+      </p:cxnSp>
+    </p:spTree>
+    <p:extLst>
+      <p:ext uri="{BB962C8B-B14F-4D97-AF65-F5344CB8AC3E}">
+        <p14:creationId xmlns:p14="http://schemas.microsoft.com/office/powerpoint/2010/main" val="3210012156"/>
+      </p:ext>
+    </p:extLst>
+  </p:cSld>
+  <p:clrMapOvr>
+    <a:masterClrMapping/>
+  </p:clrMapOvr>
+</p:sld>
+</file>
+
+<file path=ppt/slides/slide5.xml><?xml version="1.0" encoding="utf-8"?>
+<p:sld xmlns:a="http://schemas.openxmlformats.org/drawingml/2006/main" xmlns:r="http://schemas.openxmlformats.org/officeDocument/2006/relationships" xmlns:p="http://schemas.openxmlformats.org/presentationml/2006/main">
+  <p:cSld>
+    <p:spTree>
+      <p:nvGrpSpPr>
+        <p:cNvPr id="1" name=""/>
+        <p:cNvGrpSpPr/>
+        <p:nvPr/>
+      </p:nvGrpSpPr>
+      <p:grpSpPr>
+        <a:xfrm>
+          <a:off x="0" y="0"/>
+          <a:ext cx="0" cy="0"/>
+          <a:chOff x="0" y="0"/>
+          <a:chExt cx="0" cy="0"/>
+        </a:xfrm>
+      </p:grpSpPr>
+      <p:sp>
+        <p:nvSpPr>
+          <p:cNvPr id="2" name="Titel 1">
+            <a:extLst>
+              <a:ext uri="{FF2B5EF4-FFF2-40B4-BE49-F238E27FC236}">
+                <a16:creationId xmlns:a16="http://schemas.microsoft.com/office/drawing/2014/main" id="{0B386DDC-E429-7434-513B-9F8F98550C2D}"/>
+              </a:ext>
+            </a:extLst>
+          </p:cNvPr>
+          <p:cNvSpPr>
+            <a:spLocks noGrp="1"/>
+          </p:cNvSpPr>
+          <p:nvPr>
+            <p:ph type="title"/>
+          </p:nvPr>
+        </p:nvSpPr>
+        <p:spPr/>
+        <p:txBody>
+          <a:bodyPr/>
+          <a:lstStyle/>
+          <a:p>
+            <a:r>
+              <a:rPr lang="de-DE" dirty="0"/>
+              <a:t>Wissenschaftliche Arbeit</a:t>
+            </a:r>
+            <a:endParaRPr lang="en-US" dirty="0"/>
+          </a:p>
+        </p:txBody>
+      </p:sp>
+      <p:pic>
+        <p:nvPicPr>
+          <p:cNvPr id="7" name="Grafik 6">
+            <a:extLst>
+              <a:ext uri="{FF2B5EF4-FFF2-40B4-BE49-F238E27FC236}">
+                <a16:creationId xmlns:a16="http://schemas.microsoft.com/office/drawing/2014/main" id="{94FA84F8-00FA-0144-B817-7EB2EBE5C852}"/>
+              </a:ext>
+            </a:extLst>
+          </p:cNvPr>
+          <p:cNvPicPr>
+            <a:picLocks noChangeAspect="1"/>
+          </p:cNvPicPr>
+          <p:nvPr/>
+        </p:nvPicPr>
+        <p:blipFill>
+          <a:blip r:embed="rId2"/>
+          <a:stretch>
+            <a:fillRect/>
+          </a:stretch>
+        </p:blipFill>
+        <p:spPr>
+          <a:xfrm>
+            <a:off x="997524" y="1343801"/>
+            <a:ext cx="4959931" cy="2465526"/>
+          </a:xfrm>
+          <a:prstGeom prst="rect">
+            <a:avLst/>
+          </a:prstGeom>
+        </p:spPr>
+      </p:pic>
+      <p:sp>
+        <p:nvSpPr>
+          <p:cNvPr id="4" name="Textfeld 3">
+            <a:extLst>
+              <a:ext uri="{FF2B5EF4-FFF2-40B4-BE49-F238E27FC236}">
+                <a16:creationId xmlns:a16="http://schemas.microsoft.com/office/drawing/2014/main" id="{196AC41C-2E48-7522-69E6-15C0445A0677}"/>
+              </a:ext>
+            </a:extLst>
+          </p:cNvPr>
+          <p:cNvSpPr txBox="1"/>
+          <p:nvPr/>
+        </p:nvSpPr>
+        <p:spPr>
+          <a:xfrm>
+            <a:off x="838200" y="3940083"/>
+            <a:ext cx="9855206" cy="2031325"/>
+          </a:xfrm>
+          <a:prstGeom prst="rect">
+            <a:avLst/>
+          </a:prstGeom>
+          <a:noFill/>
+        </p:spPr>
+        <p:txBody>
+          <a:bodyPr wrap="square" rtlCol="0">
+            <a:spAutoFit/>
+          </a:bodyPr>
+          <a:lstStyle/>
+          <a:p>
+            <a:r>
+              <a:rPr lang="de-DE" b="1" dirty="0"/>
+              <a:t>Für uns wichtige Meilensteine:</a:t>
+            </a:r>
+          </a:p>
+          <a:p>
+            <a:pPr marL="342900" indent="-342900">
+              <a:buAutoNum type="arabicPeriod"/>
+            </a:pPr>
+            <a:r>
+              <a:rPr lang="de-DE" dirty="0"/>
+              <a:t>Ausschreibung </a:t>
+            </a:r>
+            <a:r>
+              <a:rPr lang="de-DE" dirty="0" err="1"/>
+              <a:t>rSOC</a:t>
+            </a:r>
+            <a:r>
+              <a:rPr lang="de-DE" dirty="0"/>
+              <a:t> Versuchstand erfolgreich beendet</a:t>
+            </a:r>
+          </a:p>
+          <a:p>
+            <a:pPr marL="342900" indent="-342900">
+              <a:buAutoNum type="arabicPeriod"/>
+            </a:pPr>
+            <a:r>
+              <a:rPr lang="de-DE" dirty="0"/>
+              <a:t>Inbetriebnahme </a:t>
+            </a:r>
+            <a:r>
+              <a:rPr lang="de-DE" dirty="0" err="1"/>
+              <a:t>rSOC</a:t>
+            </a:r>
+            <a:r>
+              <a:rPr lang="de-DE" dirty="0"/>
+              <a:t> Versuchstand abgeschlossen</a:t>
+            </a:r>
+          </a:p>
+          <a:p>
+            <a:pPr marL="342900" indent="-342900">
+              <a:buAutoNum type="arabicPeriod"/>
+            </a:pPr>
+            <a:r>
+              <a:rPr lang="de-DE" dirty="0"/>
+              <a:t>Fertigstellung der KWK-Einzelmodelle abgeschlossen</a:t>
+            </a:r>
+          </a:p>
+          <a:p>
+            <a:pPr marL="342900" indent="-342900">
+              <a:buAutoNum type="arabicPeriod"/>
+            </a:pPr>
+            <a:r>
+              <a:rPr lang="de-DE" dirty="0"/>
+              <a:t>Versuchsergebnisse zu Wasserstoff in KWK-Systemen liegen vor</a:t>
+            </a:r>
+          </a:p>
+          <a:p>
+            <a:pPr marL="342900" indent="-342900">
+              <a:buAutoNum type="arabicPeriod"/>
+            </a:pPr>
+            <a:r>
+              <a:rPr lang="de-DE" dirty="0"/>
+              <a:t>Analyse Anwendungspotential </a:t>
+            </a:r>
+            <a:r>
+              <a:rPr lang="de-DE" dirty="0" err="1"/>
+              <a:t>rSOFC</a:t>
+            </a:r>
+            <a:r>
+              <a:rPr lang="de-DE" dirty="0"/>
+              <a:t> abgeschlossen; Anwendungsfälle identifiziert</a:t>
+            </a:r>
+          </a:p>
+          <a:p>
+            <a:pPr marL="342900" indent="-342900">
+              <a:buAutoNum type="arabicPeriod"/>
+            </a:pPr>
+            <a:r>
+              <a:rPr lang="de-DE" dirty="0"/>
+              <a:t>Wirtschaftlichkeitsrechnungen der KWK-Anlagen im Globalsystem sind abgeschlossen</a:t>
+            </a:r>
+          </a:p>
+        </p:txBody>
+      </p:sp>
+      <p:sp>
+        <p:nvSpPr>
+          <p:cNvPr id="5" name="Textfeld 4">
+            <a:extLst>
+              <a:ext uri="{FF2B5EF4-FFF2-40B4-BE49-F238E27FC236}">
+                <a16:creationId xmlns:a16="http://schemas.microsoft.com/office/drawing/2014/main" id="{625F5390-20E9-F926-F4DD-870366DA6B65}"/>
+              </a:ext>
+            </a:extLst>
+          </p:cNvPr>
+          <p:cNvSpPr txBox="1"/>
+          <p:nvPr/>
+        </p:nvSpPr>
+        <p:spPr>
+          <a:xfrm>
+            <a:off x="6710221" y="1821444"/>
+            <a:ext cx="4484255" cy="369332"/>
+          </a:xfrm>
+          <a:prstGeom prst="rect">
+            <a:avLst/>
+          </a:prstGeom>
+          <a:noFill/>
+        </p:spPr>
+        <p:txBody>
+          <a:bodyPr wrap="square" rtlCol="0">
+            <a:spAutoFit/>
+          </a:bodyPr>
+          <a:lstStyle/>
+          <a:p>
+            <a:r>
+              <a:rPr lang="de-DE" b="1" dirty="0">
+                <a:sym typeface="Wingdings" panose="05000000000000000000" pitchFamily="2" charset="2"/>
+              </a:rPr>
+              <a:t> </a:t>
+            </a:r>
+            <a:r>
+              <a:rPr lang="de-DE" dirty="0">
+                <a:sym typeface="Wingdings" panose="05000000000000000000" pitchFamily="2" charset="2"/>
+              </a:rPr>
+              <a:t>Wir liegen sehr gut im Zeitplan!</a:t>
+            </a:r>
+            <a:endParaRPr lang="de-DE" dirty="0"/>
+          </a:p>
+        </p:txBody>
+      </p:sp>
+    </p:spTree>
+    <p:extLst>
+      <p:ext uri="{BB962C8B-B14F-4D97-AF65-F5344CB8AC3E}">
+        <p14:creationId xmlns:p14="http://schemas.microsoft.com/office/powerpoint/2010/main" val="3616354961"/>
+      </p:ext>
+    </p:extLst>
+  </p:cSld>
+  <p:clrMapOvr>
+    <a:masterClrMapping/>
+  </p:clrMapOvr>
+  <p:transition spd="slow">
+    <p:wipe/>
+  </p:transition>
+  <p:timing>
+    <p:tnLst>
+      <p:par>
+        <p:cTn id="1" dur="indefinite" restart="never" nodeType="tmRoot">
+          <p:childTnLst>
+            <p:seq concurrent="1" nextAc="seek">
+              <p:cTn id="2" dur="indefinite" nodeType="mainSeq">
+                <p:childTnLst>
+                  <p:par>
+                    <p:cTn id="3" fill="hold">
+                      <p:stCondLst>
+                        <p:cond delay="indefinite"/>
+                      </p:stCondLst>
+                      <p:childTnLst>
+                        <p:par>
+                          <p:cTn id="4" fill="hold">
+                            <p:stCondLst>
+                              <p:cond delay="0"/>
+                            </p:stCondLst>
+                            <p:childTnLst>
+                              <p:par>
+                                <p:cTn id="5" presetID="10" presetClass="entr" presetSubtype="0" fill="hold" grpId="0" nodeType="clickEffect">
+                                  <p:stCondLst>
+                                    <p:cond delay="0"/>
+                                  </p:stCondLst>
+                                  <p:childTnLst>
+                                    <p:set>
+                                      <p:cBhvr>
+                                        <p:cTn id="6" dur="1" fill="hold">
+                                          <p:stCondLst>
+                                            <p:cond delay="0"/>
+                                          </p:stCondLst>
+                                        </p:cTn>
+                                        <p:tgtEl>
+                                          <p:spTgt spid="5"/>
+                                        </p:tgtEl>
+                                        <p:attrNameLst>
+                                          <p:attrName>style.visibility</p:attrName>
+                                        </p:attrNameLst>
+                                      </p:cBhvr>
+                                      <p:to>
+                                        <p:strVal val="visible"/>
+                                      </p:to>
+                                    </p:set>
+                                    <p:animEffect transition="in" filter="fade">
+                                      <p:cBhvr>
+                                        <p:cTn id="7" dur="500"/>
+                                        <p:tgtEl>
+                                          <p:spTgt spid="5"/>
+                                        </p:tgtEl>
+                                      </p:cBhvr>
+                                    </p:animEffect>
+                                  </p:childTnLst>
+                                </p:cTn>
+                              </p:par>
+                            </p:childTnLst>
+                          </p:cTn>
+                        </p:par>
+                      </p:childTnLst>
+                    </p:cTn>
+                  </p:par>
+                </p:childTnLst>
+              </p:cTn>
+              <p:prevCondLst>
+                <p:cond evt="onPrev" delay="0">
+                  <p:tgtEl>
+                    <p:sldTgt/>
+                  </p:tgtEl>
+                </p:cond>
+              </p:prevCondLst>
+              <p:nextCondLst>
+                <p:cond evt="onNext" delay="0">
+                  <p:tgtEl>
+                    <p:sldTgt/>
+                  </p:tgtEl>
+                </p:cond>
+              </p:nextCondLst>
+            </p:seq>
+          </p:childTnLst>
+        </p:cTn>
+      </p:par>
+    </p:tnLst>
+    <p:bldLst>
+      <p:bldP spid="5" grpId="0"/>
+    </p:bldLst>
+  </p:timing>
+</p:sld>
+</file>
+
+<file path=ppt/slides/slide6.xml><?xml version="1.0" encoding="utf-8"?>
+<p:sld xmlns:a="http://schemas.openxmlformats.org/drawingml/2006/main" xmlns:r="http://schemas.openxmlformats.org/officeDocument/2006/relationships" xmlns:p="http://schemas.openxmlformats.org/presentationml/2006/main">
+  <p:cSld>
+    <p:spTree>
+      <p:nvGrpSpPr>
+        <p:cNvPr id="1" name=""/>
+        <p:cNvGrpSpPr/>
+        <p:nvPr/>
+      </p:nvGrpSpPr>
+      <p:grpSpPr>
+        <a:xfrm>
+          <a:off x="0" y="0"/>
+          <a:ext cx="0" cy="0"/>
+          <a:chOff x="0" y="0"/>
+          <a:chExt cx="0" cy="0"/>
+        </a:xfrm>
+      </p:grpSpPr>
+      <p:sp>
+        <p:nvSpPr>
+          <p:cNvPr id="13" name="Textfeld 12">
+            <a:extLst>
+              <a:ext uri="{FF2B5EF4-FFF2-40B4-BE49-F238E27FC236}">
+                <a16:creationId xmlns:a16="http://schemas.microsoft.com/office/drawing/2014/main" id="{8719FAB7-A2F0-F439-2D0D-D41FC52B5686}"/>
+              </a:ext>
+            </a:extLst>
+          </p:cNvPr>
+          <p:cNvSpPr txBox="1"/>
+          <p:nvPr/>
+        </p:nvSpPr>
+        <p:spPr>
+          <a:xfrm>
+            <a:off x="7758807" y="3780506"/>
+            <a:ext cx="2379836" cy="2031325"/>
+          </a:xfrm>
+          <a:prstGeom prst="rect">
+            <a:avLst/>
+          </a:prstGeom>
+          <a:noFill/>
+        </p:spPr>
+        <p:txBody>
+          <a:bodyPr wrap="square" rtlCol="0">
+            <a:spAutoFit/>
+          </a:bodyPr>
+          <a:lstStyle/>
+          <a:p>
+            <a:r>
+              <a:rPr lang="de-DE" dirty="0"/>
+              <a:t>Beschaffung eines </a:t>
+            </a:r>
+            <a:r>
+              <a:rPr lang="de-DE" b="1" dirty="0"/>
+              <a:t>Einzelzellen-teststands</a:t>
+            </a:r>
+            <a:r>
+              <a:rPr lang="de-DE" dirty="0"/>
+              <a:t> und Analyse von </a:t>
+            </a:r>
+            <a:r>
+              <a:rPr lang="de-DE" b="1" dirty="0"/>
+              <a:t>Anwendungsfällen</a:t>
+            </a:r>
+            <a:r>
+              <a:rPr lang="de-DE" dirty="0"/>
+              <a:t> und Wirtschaftlichkeit </a:t>
+            </a:r>
+          </a:p>
+          <a:p>
+            <a:endParaRPr lang="en-US" dirty="0"/>
+          </a:p>
+        </p:txBody>
+      </p:sp>
+      <p:sp>
+        <p:nvSpPr>
+          <p:cNvPr id="2" name="Titel 1">
+            <a:extLst>
+              <a:ext uri="{FF2B5EF4-FFF2-40B4-BE49-F238E27FC236}">
+                <a16:creationId xmlns:a16="http://schemas.microsoft.com/office/drawing/2014/main" id="{0B386DDC-E429-7434-513B-9F8F98550C2D}"/>
+              </a:ext>
+            </a:extLst>
+          </p:cNvPr>
+          <p:cNvSpPr>
+            <a:spLocks noGrp="1"/>
+          </p:cNvSpPr>
+          <p:nvPr>
+            <p:ph type="title"/>
+          </p:nvPr>
+        </p:nvSpPr>
+        <p:spPr/>
+        <p:txBody>
+          <a:bodyPr/>
+          <a:lstStyle/>
+          <a:p>
+            <a:r>
+              <a:rPr lang="de-DE" dirty="0"/>
+              <a:t>Promotionsinhalte</a:t>
+            </a:r>
+            <a:endParaRPr lang="en-US" dirty="0"/>
+          </a:p>
+        </p:txBody>
+      </p:sp>
+      <p:sp>
+        <p:nvSpPr>
+          <p:cNvPr id="4" name="Ellipse 3">
+            <a:extLst>
+              <a:ext uri="{FF2B5EF4-FFF2-40B4-BE49-F238E27FC236}">
+                <a16:creationId xmlns:a16="http://schemas.microsoft.com/office/drawing/2014/main" id="{9428A134-5DF3-0D25-8337-D31B1B7C8587}"/>
+              </a:ext>
+            </a:extLst>
+          </p:cNvPr>
+          <p:cNvSpPr/>
+          <p:nvPr/>
+        </p:nvSpPr>
+        <p:spPr>
+          <a:xfrm>
+            <a:off x="4046611" y="3108471"/>
+            <a:ext cx="3190730" cy="3190730"/>
+          </a:xfrm>
+          <a:prstGeom prst="ellipse">
+            <a:avLst/>
+          </a:prstGeom>
+          <a:solidFill>
+            <a:schemeClr val="accent1">
+              <a:alpha val="70000"/>
+            </a:schemeClr>
+          </a:solidFill>
+        </p:spPr>
+        <p:style>
+          <a:lnRef idx="2">
+            <a:schemeClr val="accent1">
+              <a:shade val="15000"/>
+            </a:schemeClr>
+          </a:lnRef>
+          <a:fillRef idx="1">
+            <a:schemeClr val="accent1"/>
+          </a:fillRef>
+          <a:effectRef idx="0">
+            <a:schemeClr val="accent1"/>
+          </a:effectRef>
+          <a:fontRef idx="minor">
+            <a:schemeClr val="lt1"/>
+          </a:fontRef>
+        </p:style>
+        <p:txBody>
+          <a:bodyPr rtlCol="0" anchor="ctr"/>
+          <a:lstStyle/>
+          <a:p>
+            <a:pPr algn="ctr"/>
+            <a:r>
+              <a:rPr lang="de-DE" dirty="0" err="1"/>
+              <a:t>HyDi.KWK</a:t>
+            </a:r>
+            <a:endParaRPr lang="en-US" dirty="0"/>
+          </a:p>
+        </p:txBody>
+      </p:sp>
+      <p:sp>
+        <p:nvSpPr>
+          <p:cNvPr id="5" name="Ellipse 4">
+            <a:extLst>
+              <a:ext uri="{FF2B5EF4-FFF2-40B4-BE49-F238E27FC236}">
+                <a16:creationId xmlns:a16="http://schemas.microsoft.com/office/drawing/2014/main" id="{7285328E-3314-8961-6843-E09FD1345DC6}"/>
+              </a:ext>
+            </a:extLst>
+          </p:cNvPr>
+          <p:cNvSpPr/>
+          <p:nvPr/>
+        </p:nvSpPr>
+        <p:spPr>
+          <a:xfrm>
+            <a:off x="1145310" y="1582222"/>
+            <a:ext cx="4769745" cy="2445266"/>
+          </a:xfrm>
+          <a:prstGeom prst="ellipse">
+            <a:avLst/>
+          </a:prstGeom>
+          <a:solidFill>
+            <a:schemeClr val="accent3">
+              <a:alpha val="70000"/>
+            </a:schemeClr>
+          </a:solidFill>
+        </p:spPr>
+        <p:style>
+          <a:lnRef idx="2">
+            <a:schemeClr val="accent1">
+              <a:shade val="15000"/>
+            </a:schemeClr>
+          </a:lnRef>
+          <a:fillRef idx="1">
+            <a:schemeClr val="accent1"/>
+          </a:fillRef>
+          <a:effectRef idx="0">
+            <a:schemeClr val="accent1"/>
+          </a:effectRef>
+          <a:fontRef idx="minor">
+            <a:schemeClr val="lt1"/>
+          </a:fontRef>
+        </p:style>
+        <p:txBody>
+          <a:bodyPr rtlCol="0" anchor="ctr"/>
+          <a:lstStyle/>
+          <a:p>
+            <a:pPr algn="ctr"/>
+            <a:r>
+              <a:rPr lang="de-DE" dirty="0"/>
+              <a:t>Meine möglichen Promotionsinhalte</a:t>
+            </a:r>
+            <a:endParaRPr lang="en-US" dirty="0"/>
+          </a:p>
+        </p:txBody>
+      </p:sp>
+      <p:sp>
+        <p:nvSpPr>
+          <p:cNvPr id="3" name="Ellipse 2">
+            <a:extLst>
+              <a:ext uri="{FF2B5EF4-FFF2-40B4-BE49-F238E27FC236}">
+                <a16:creationId xmlns:a16="http://schemas.microsoft.com/office/drawing/2014/main" id="{3F5F5012-9116-51DB-7E6F-14C1368A4B2F}"/>
+              </a:ext>
+            </a:extLst>
+          </p:cNvPr>
+          <p:cNvSpPr/>
+          <p:nvPr/>
+        </p:nvSpPr>
+        <p:spPr>
+          <a:xfrm>
+            <a:off x="4547467" y="1690688"/>
+            <a:ext cx="2189018" cy="2189018"/>
+          </a:xfrm>
+          <a:prstGeom prst="ellipse">
+            <a:avLst/>
+          </a:prstGeom>
+          <a:solidFill>
+            <a:schemeClr val="accent2">
+              <a:alpha val="70000"/>
+            </a:schemeClr>
+          </a:solidFill>
+        </p:spPr>
+        <p:style>
+          <a:lnRef idx="2">
+            <a:schemeClr val="accent1">
+              <a:shade val="15000"/>
+            </a:schemeClr>
+          </a:lnRef>
+          <a:fillRef idx="1">
+            <a:schemeClr val="accent1"/>
+          </a:fillRef>
+          <a:effectRef idx="0">
+            <a:schemeClr val="accent1"/>
+          </a:effectRef>
+          <a:fontRef idx="minor">
+            <a:schemeClr val="lt1"/>
+          </a:fontRef>
+        </p:style>
+        <p:txBody>
+          <a:bodyPr rtlCol="0" anchor="ctr"/>
+          <a:lstStyle/>
+          <a:p>
+            <a:pPr algn="ctr"/>
+            <a:r>
+              <a:rPr lang="de-DE" dirty="0"/>
+              <a:t>Colins Dissertation</a:t>
+            </a:r>
+            <a:endParaRPr lang="en-US" dirty="0"/>
+          </a:p>
+        </p:txBody>
+      </p:sp>
+      <p:cxnSp>
+        <p:nvCxnSpPr>
+          <p:cNvPr id="8" name="Gerade Verbindung mit Pfeil 7">
+            <a:extLst>
+              <a:ext uri="{FF2B5EF4-FFF2-40B4-BE49-F238E27FC236}">
+                <a16:creationId xmlns:a16="http://schemas.microsoft.com/office/drawing/2014/main" id="{AA5BAD29-50C8-1410-A203-A500941540B3}"/>
+              </a:ext>
+            </a:extLst>
+          </p:cNvPr>
+          <p:cNvCxnSpPr>
+            <a:cxnSpLocks/>
+            <a:endCxn id="3" idx="7"/>
+          </p:cNvCxnSpPr>
+          <p:nvPr/>
+        </p:nvCxnSpPr>
+        <p:spPr>
+          <a:xfrm flipH="1">
+            <a:off x="6415911" y="1766888"/>
+            <a:ext cx="521465" cy="244374"/>
+          </a:xfrm>
+          <a:prstGeom prst="straightConnector1">
+            <a:avLst/>
+          </a:prstGeom>
+          <a:ln>
+            <a:tailEnd type="triangle"/>
+          </a:ln>
+        </p:spPr>
+        <p:style>
+          <a:lnRef idx="2">
+            <a:schemeClr val="accent1"/>
+          </a:lnRef>
+          <a:fillRef idx="0">
+            <a:schemeClr val="accent1"/>
+          </a:fillRef>
+          <a:effectRef idx="1">
+            <a:schemeClr val="accent1"/>
+          </a:effectRef>
+          <a:fontRef idx="minor">
+            <a:schemeClr val="tx1"/>
+          </a:fontRef>
+        </p:style>
+      </p:cxnSp>
+      <p:sp>
+        <p:nvSpPr>
+          <p:cNvPr id="11" name="Textfeld 10">
+            <a:extLst>
+              <a:ext uri="{FF2B5EF4-FFF2-40B4-BE49-F238E27FC236}">
+                <a16:creationId xmlns:a16="http://schemas.microsoft.com/office/drawing/2014/main" id="{D83F673B-9FE2-6783-A406-7E900AF36785}"/>
+              </a:ext>
+            </a:extLst>
+          </p:cNvPr>
+          <p:cNvSpPr txBox="1"/>
+          <p:nvPr/>
+        </p:nvSpPr>
+        <p:spPr>
+          <a:xfrm>
+            <a:off x="6984091" y="1582222"/>
+            <a:ext cx="2686960" cy="923330"/>
+          </a:xfrm>
+          <a:prstGeom prst="rect">
+            <a:avLst/>
+          </a:prstGeom>
+          <a:noFill/>
+        </p:spPr>
+        <p:txBody>
+          <a:bodyPr wrap="square" rtlCol="0">
+            <a:spAutoFit/>
+          </a:bodyPr>
+          <a:lstStyle/>
+          <a:p>
+            <a:r>
+              <a:rPr lang="de-DE" dirty="0"/>
+              <a:t>Fokus auf numerische Modelle und Kinetik</a:t>
+            </a:r>
+          </a:p>
+          <a:p>
+            <a:r>
+              <a:rPr lang="de-DE" dirty="0"/>
+              <a:t>(</a:t>
+            </a:r>
+            <a:r>
+              <a:rPr lang="de-DE" b="1" dirty="0"/>
+              <a:t>Einzelzellenmodell</a:t>
+            </a:r>
+            <a:r>
+              <a:rPr lang="de-DE" dirty="0"/>
+              <a:t>)</a:t>
+            </a:r>
+            <a:endParaRPr lang="en-US" dirty="0"/>
+          </a:p>
+        </p:txBody>
+      </p:sp>
+      <p:cxnSp>
+        <p:nvCxnSpPr>
+          <p:cNvPr id="12" name="Gerade Verbindung mit Pfeil 11">
+            <a:extLst>
+              <a:ext uri="{FF2B5EF4-FFF2-40B4-BE49-F238E27FC236}">
+                <a16:creationId xmlns:a16="http://schemas.microsoft.com/office/drawing/2014/main" id="{A3686B0D-7219-6E07-39A5-5A11017303F7}"/>
+              </a:ext>
+            </a:extLst>
+          </p:cNvPr>
+          <p:cNvCxnSpPr>
+            <a:cxnSpLocks/>
+          </p:cNvCxnSpPr>
+          <p:nvPr/>
+        </p:nvCxnSpPr>
+        <p:spPr>
+          <a:xfrm flipH="1">
+            <a:off x="7237341" y="4138288"/>
+            <a:ext cx="521465" cy="244374"/>
+          </a:xfrm>
+          <a:prstGeom prst="straightConnector1">
+            <a:avLst/>
+          </a:prstGeom>
+          <a:ln>
+            <a:tailEnd type="triangle"/>
+          </a:ln>
+        </p:spPr>
+        <p:style>
+          <a:lnRef idx="2">
+            <a:schemeClr val="accent1"/>
+          </a:lnRef>
+          <a:fillRef idx="0">
+            <a:schemeClr val="accent1"/>
+          </a:fillRef>
+          <a:effectRef idx="1">
+            <a:schemeClr val="accent1"/>
+          </a:effectRef>
+          <a:fontRef idx="minor">
+            <a:schemeClr val="tx1"/>
+          </a:fontRef>
+        </p:style>
+      </p:cxnSp>
+      <p:cxnSp>
+        <p:nvCxnSpPr>
+          <p:cNvPr id="14" name="Gerade Verbindung mit Pfeil 13">
+            <a:extLst>
+              <a:ext uri="{FF2B5EF4-FFF2-40B4-BE49-F238E27FC236}">
+                <a16:creationId xmlns:a16="http://schemas.microsoft.com/office/drawing/2014/main" id="{E262C3DC-9D33-C117-E6E9-779D8A84B39A}"/>
+              </a:ext>
+            </a:extLst>
+          </p:cNvPr>
+          <p:cNvCxnSpPr>
+            <a:cxnSpLocks/>
+            <a:endCxn id="5" idx="3"/>
+          </p:cNvCxnSpPr>
+          <p:nvPr/>
+        </p:nvCxnSpPr>
+        <p:spPr>
+          <a:xfrm flipV="1">
+            <a:off x="1178858" y="3669387"/>
+            <a:ext cx="664965" cy="591088"/>
+          </a:xfrm>
+          <a:prstGeom prst="straightConnector1">
+            <a:avLst/>
+          </a:prstGeom>
+          <a:ln>
+            <a:tailEnd type="triangle"/>
+          </a:ln>
+        </p:spPr>
+        <p:style>
+          <a:lnRef idx="2">
+            <a:schemeClr val="accent1"/>
+          </a:lnRef>
+          <a:fillRef idx="0">
+            <a:schemeClr val="accent1"/>
+          </a:fillRef>
+          <a:effectRef idx="1">
+            <a:schemeClr val="accent1"/>
+          </a:effectRef>
+          <a:fontRef idx="minor">
+            <a:schemeClr val="tx1"/>
+          </a:fontRef>
+        </p:style>
+      </p:cxnSp>
+      <p:sp>
+        <p:nvSpPr>
+          <p:cNvPr id="17" name="Textfeld 16">
+            <a:extLst>
+              <a:ext uri="{FF2B5EF4-FFF2-40B4-BE49-F238E27FC236}">
+                <a16:creationId xmlns:a16="http://schemas.microsoft.com/office/drawing/2014/main" id="{8D988EE8-E2A8-0BC2-6E2A-5C27A009479F}"/>
+              </a:ext>
+            </a:extLst>
+          </p:cNvPr>
+          <p:cNvSpPr txBox="1"/>
+          <p:nvPr/>
+        </p:nvSpPr>
+        <p:spPr>
+          <a:xfrm>
+            <a:off x="526473" y="4216543"/>
+            <a:ext cx="3426692" cy="2308324"/>
+          </a:xfrm>
+          <a:prstGeom prst="rect">
+            <a:avLst/>
+          </a:prstGeom>
+          <a:noFill/>
+        </p:spPr>
+        <p:txBody>
+          <a:bodyPr wrap="square" rtlCol="0">
+            <a:spAutoFit/>
+          </a:bodyPr>
+          <a:lstStyle/>
+          <a:p>
+            <a:r>
+              <a:rPr lang="de-DE" dirty="0"/>
+              <a:t>Als Basis habe ich </a:t>
+            </a:r>
+            <a:r>
+              <a:rPr lang="de-DE" b="1" dirty="0"/>
+              <a:t>Colins</a:t>
+            </a:r>
+            <a:r>
+              <a:rPr lang="de-DE" dirty="0"/>
+              <a:t> </a:t>
+            </a:r>
+            <a:r>
+              <a:rPr lang="de-DE" b="1" dirty="0"/>
+              <a:t>Dissertation</a:t>
+            </a:r>
+            <a:r>
+              <a:rPr lang="de-DE" dirty="0"/>
+              <a:t> und den </a:t>
+            </a:r>
+            <a:r>
+              <a:rPr lang="de-DE" b="1" dirty="0"/>
+              <a:t>Einzelzellenteststand</a:t>
+            </a:r>
+            <a:r>
+              <a:rPr lang="de-DE" dirty="0"/>
+              <a:t> vom </a:t>
+            </a:r>
+            <a:r>
+              <a:rPr lang="de-DE" dirty="0" err="1"/>
+              <a:t>HyDi.KWK</a:t>
+            </a:r>
+            <a:r>
+              <a:rPr lang="de-DE" dirty="0"/>
+              <a:t>. Daraus ergeben sich mehrere Möglichkeiten für mich zur </a:t>
+            </a:r>
+            <a:r>
+              <a:rPr lang="de-DE" b="1" dirty="0"/>
+              <a:t>Fortführung, Validierung und Erweiterung </a:t>
+            </a:r>
+            <a:r>
+              <a:rPr lang="de-DE" dirty="0"/>
+              <a:t>von Colins Arbeit</a:t>
+            </a:r>
+            <a:endParaRPr lang="en-US" dirty="0"/>
+          </a:p>
+        </p:txBody>
+      </p:sp>
+      <p:cxnSp>
+        <p:nvCxnSpPr>
+          <p:cNvPr id="28" name="Gerade Verbindung mit Pfeil 27">
+            <a:extLst>
+              <a:ext uri="{FF2B5EF4-FFF2-40B4-BE49-F238E27FC236}">
+                <a16:creationId xmlns:a16="http://schemas.microsoft.com/office/drawing/2014/main" id="{56F82194-7CC5-C651-8522-17C073F19691}"/>
+              </a:ext>
+            </a:extLst>
+          </p:cNvPr>
+          <p:cNvCxnSpPr>
+            <a:cxnSpLocks/>
+          </p:cNvCxnSpPr>
+          <p:nvPr/>
+        </p:nvCxnSpPr>
+        <p:spPr>
+          <a:xfrm>
+            <a:off x="10152786" y="1541318"/>
+            <a:ext cx="0" cy="4676775"/>
+          </a:xfrm>
+          <a:prstGeom prst="straightConnector1">
+            <a:avLst/>
+          </a:prstGeom>
+          <a:ln w="76200">
+            <a:solidFill>
+              <a:schemeClr val="tx1"/>
+            </a:solidFill>
+            <a:tailEnd type="triangle"/>
+          </a:ln>
+        </p:spPr>
+        <p:style>
+          <a:lnRef idx="2">
+            <a:schemeClr val="accent1"/>
+          </a:lnRef>
+          <a:fillRef idx="0">
+            <a:schemeClr val="accent1"/>
+          </a:fillRef>
+          <a:effectRef idx="1">
+            <a:schemeClr val="accent1"/>
+          </a:effectRef>
+          <a:fontRef idx="minor">
+            <a:schemeClr val="tx1"/>
+          </a:fontRef>
+        </p:style>
+      </p:cxnSp>
+      <p:sp>
+        <p:nvSpPr>
+          <p:cNvPr id="33" name="Textfeld 32">
+            <a:extLst>
+              <a:ext uri="{FF2B5EF4-FFF2-40B4-BE49-F238E27FC236}">
+                <a16:creationId xmlns:a16="http://schemas.microsoft.com/office/drawing/2014/main" id="{9B69673F-CC2F-2D53-DC3A-64B943AEE960}"/>
+              </a:ext>
+            </a:extLst>
+          </p:cNvPr>
+          <p:cNvSpPr txBox="1"/>
+          <p:nvPr/>
+        </p:nvSpPr>
+        <p:spPr>
+          <a:xfrm>
+            <a:off x="10248691" y="1449545"/>
+            <a:ext cx="2686960" cy="646331"/>
+          </a:xfrm>
+          <a:prstGeom prst="rect">
+            <a:avLst/>
+          </a:prstGeom>
+          <a:noFill/>
+        </p:spPr>
+        <p:txBody>
+          <a:bodyPr wrap="square" rtlCol="0">
+            <a:spAutoFit/>
+          </a:bodyPr>
+          <a:lstStyle/>
+          <a:p>
+            <a:r>
+              <a:rPr lang="de-DE" dirty="0">
+                <a:solidFill>
+                  <a:schemeClr val="bg2">
+                    <a:lumMod val="50000"/>
+                  </a:schemeClr>
+                </a:solidFill>
+              </a:rPr>
+              <a:t>Makroskopisches</a:t>
+            </a:r>
+          </a:p>
+          <a:p>
+            <a:r>
+              <a:rPr lang="de-DE" dirty="0">
+                <a:solidFill>
+                  <a:schemeClr val="bg2">
+                    <a:lumMod val="50000"/>
+                  </a:schemeClr>
+                </a:solidFill>
+              </a:rPr>
+              <a:t>Modell</a:t>
+            </a:r>
+            <a:endParaRPr lang="en-US" dirty="0">
+              <a:solidFill>
+                <a:schemeClr val="bg2">
+                  <a:lumMod val="50000"/>
+                </a:schemeClr>
+              </a:solidFill>
+            </a:endParaRPr>
+          </a:p>
+        </p:txBody>
+      </p:sp>
+      <p:sp>
+        <p:nvSpPr>
+          <p:cNvPr id="34" name="Textfeld 33">
+            <a:extLst>
+              <a:ext uri="{FF2B5EF4-FFF2-40B4-BE49-F238E27FC236}">
+                <a16:creationId xmlns:a16="http://schemas.microsoft.com/office/drawing/2014/main" id="{DE87856C-F8E1-A9D2-329A-4A88BDA5C111}"/>
+              </a:ext>
+            </a:extLst>
+          </p:cNvPr>
+          <p:cNvSpPr txBox="1"/>
+          <p:nvPr/>
+        </p:nvSpPr>
+        <p:spPr>
+          <a:xfrm>
+            <a:off x="10248691" y="2944573"/>
+            <a:ext cx="2686960" cy="646331"/>
+          </a:xfrm>
+          <a:prstGeom prst="rect">
+            <a:avLst/>
+          </a:prstGeom>
+          <a:noFill/>
+        </p:spPr>
+        <p:txBody>
+          <a:bodyPr wrap="square" rtlCol="0">
+            <a:spAutoFit/>
+          </a:bodyPr>
+          <a:lstStyle/>
+          <a:p>
+            <a:r>
+              <a:rPr lang="de-DE" dirty="0">
+                <a:solidFill>
+                  <a:schemeClr val="bg2">
+                    <a:lumMod val="50000"/>
+                  </a:schemeClr>
+                </a:solidFill>
+              </a:rPr>
+              <a:t>Einzelzellen-</a:t>
+            </a:r>
+          </a:p>
+          <a:p>
+            <a:r>
+              <a:rPr lang="de-DE" dirty="0" err="1">
+                <a:solidFill>
+                  <a:schemeClr val="bg2">
+                    <a:lumMod val="50000"/>
+                  </a:schemeClr>
+                </a:solidFill>
+              </a:rPr>
+              <a:t>modell</a:t>
+            </a:r>
+            <a:endParaRPr lang="en-US" dirty="0">
+              <a:solidFill>
+                <a:schemeClr val="bg2">
+                  <a:lumMod val="50000"/>
+                </a:schemeClr>
+              </a:solidFill>
+            </a:endParaRPr>
+          </a:p>
+        </p:txBody>
+      </p:sp>
+      <p:sp>
+        <p:nvSpPr>
+          <p:cNvPr id="35" name="Textfeld 34">
+            <a:extLst>
+              <a:ext uri="{FF2B5EF4-FFF2-40B4-BE49-F238E27FC236}">
+                <a16:creationId xmlns:a16="http://schemas.microsoft.com/office/drawing/2014/main" id="{CDCF4B67-6D00-8377-A6B5-3D5AB7ED1FA6}"/>
+              </a:ext>
+            </a:extLst>
+          </p:cNvPr>
+          <p:cNvSpPr txBox="1"/>
+          <p:nvPr/>
+        </p:nvSpPr>
+        <p:spPr>
+          <a:xfrm>
+            <a:off x="10248691" y="4439601"/>
+            <a:ext cx="2686960" cy="369332"/>
+          </a:xfrm>
+          <a:prstGeom prst="rect">
+            <a:avLst/>
+          </a:prstGeom>
+          <a:noFill/>
+        </p:spPr>
+        <p:txBody>
+          <a:bodyPr wrap="square" rtlCol="0">
+            <a:spAutoFit/>
+          </a:bodyPr>
+          <a:lstStyle/>
+          <a:p>
+            <a:r>
+              <a:rPr lang="de-DE" dirty="0" err="1">
+                <a:solidFill>
+                  <a:schemeClr val="bg2">
+                    <a:lumMod val="50000"/>
+                  </a:schemeClr>
+                </a:solidFill>
+              </a:rPr>
+              <a:t>Stackmodell</a:t>
+            </a:r>
+            <a:endParaRPr lang="en-US" dirty="0">
+              <a:solidFill>
+                <a:schemeClr val="bg2">
+                  <a:lumMod val="50000"/>
+                </a:schemeClr>
+              </a:solidFill>
+            </a:endParaRPr>
+          </a:p>
+        </p:txBody>
+      </p:sp>
+      <p:sp>
+        <p:nvSpPr>
+          <p:cNvPr id="36" name="Textfeld 35">
+            <a:extLst>
+              <a:ext uri="{FF2B5EF4-FFF2-40B4-BE49-F238E27FC236}">
+                <a16:creationId xmlns:a16="http://schemas.microsoft.com/office/drawing/2014/main" id="{12B6DCF8-3413-8FEC-1ADB-6E360BF35841}"/>
+              </a:ext>
+            </a:extLst>
+          </p:cNvPr>
+          <p:cNvSpPr txBox="1"/>
+          <p:nvPr/>
+        </p:nvSpPr>
+        <p:spPr>
+          <a:xfrm>
+            <a:off x="10248691" y="5657631"/>
+            <a:ext cx="2686960" cy="646331"/>
+          </a:xfrm>
+          <a:prstGeom prst="rect">
+            <a:avLst/>
+          </a:prstGeom>
+          <a:noFill/>
+        </p:spPr>
+        <p:txBody>
+          <a:bodyPr wrap="square" rtlCol="0">
+            <a:spAutoFit/>
+          </a:bodyPr>
+          <a:lstStyle/>
+          <a:p>
+            <a:r>
+              <a:rPr lang="de-DE" dirty="0">
+                <a:solidFill>
+                  <a:schemeClr val="bg2">
+                    <a:lumMod val="50000"/>
+                  </a:schemeClr>
+                </a:solidFill>
+              </a:rPr>
+              <a:t>Holistische </a:t>
+            </a:r>
+          </a:p>
+          <a:p>
+            <a:r>
+              <a:rPr lang="de-DE" dirty="0">
+                <a:solidFill>
+                  <a:schemeClr val="bg2">
+                    <a:lumMod val="50000"/>
+                  </a:schemeClr>
+                </a:solidFill>
+              </a:rPr>
+              <a:t>Betrachtung</a:t>
+            </a:r>
+            <a:endParaRPr lang="en-US" dirty="0">
+              <a:solidFill>
+                <a:schemeClr val="bg2">
+                  <a:lumMod val="50000"/>
+                </a:schemeClr>
+              </a:solidFill>
+            </a:endParaRPr>
+          </a:p>
+        </p:txBody>
+      </p:sp>
+    </p:spTree>
+    <p:extLst>
+      <p:ext uri="{BB962C8B-B14F-4D97-AF65-F5344CB8AC3E}">
+        <p14:creationId xmlns:p14="http://schemas.microsoft.com/office/powerpoint/2010/main" val="3642972468"/>
+      </p:ext>
+    </p:extLst>
+  </p:cSld>
+  <p:clrMapOvr>
+    <a:masterClrMapping/>
+  </p:clrMapOvr>
+</p:sld>
+</file>
+
+<file path=ppt/slides/slide7.xml><?xml version="1.0" encoding="utf-8"?>
+<p:sld xmlns:a="http://schemas.openxmlformats.org/drawingml/2006/main" xmlns:r="http://schemas.openxmlformats.org/officeDocument/2006/relationships" xmlns:p="http://schemas.openxmlformats.org/presentationml/2006/main">
+  <p:cSld>
+    <p:spTree>
+      <p:nvGrpSpPr>
+        <p:cNvPr id="1" name=""/>
+        <p:cNvGrpSpPr/>
+        <p:nvPr/>
+      </p:nvGrpSpPr>
+      <p:grpSpPr>
+        <a:xfrm>
+          <a:off x="0" y="0"/>
+          <a:ext cx="0" cy="0"/>
+          <a:chOff x="0" y="0"/>
+          <a:chExt cx="0" cy="0"/>
+        </a:xfrm>
+      </p:grpSpPr>
+      <p:sp>
+        <p:nvSpPr>
+          <p:cNvPr id="2" name="Titel 1">
+            <a:extLst>
+              <a:ext uri="{FF2B5EF4-FFF2-40B4-BE49-F238E27FC236}">
+                <a16:creationId xmlns:a16="http://schemas.microsoft.com/office/drawing/2014/main" id="{0B386DDC-E429-7434-513B-9F8F98550C2D}"/>
+              </a:ext>
+            </a:extLst>
+          </p:cNvPr>
+          <p:cNvSpPr>
+            <a:spLocks noGrp="1"/>
+          </p:cNvSpPr>
+          <p:nvPr>
+            <p:ph type="title"/>
+          </p:nvPr>
+        </p:nvSpPr>
+        <p:spPr/>
+        <p:txBody>
+          <a:bodyPr/>
+          <a:lstStyle/>
+          <a:p>
+            <a:r>
+              <a:rPr lang="de-DE" dirty="0"/>
+              <a:t>Promotionsinhalte</a:t>
+            </a:r>
+            <a:endParaRPr lang="en-US" dirty="0"/>
+          </a:p>
+        </p:txBody>
+      </p:sp>
+      <p:sp>
+        <p:nvSpPr>
+          <p:cNvPr id="6" name="Rechteck: abgerundete Ecken 5">
+            <a:extLst>
+              <a:ext uri="{FF2B5EF4-FFF2-40B4-BE49-F238E27FC236}">
+                <a16:creationId xmlns:a16="http://schemas.microsoft.com/office/drawing/2014/main" id="{DD32E9E4-61D5-0728-18CB-E856B83BD2E2}"/>
+              </a:ext>
+            </a:extLst>
+          </p:cNvPr>
+          <p:cNvSpPr/>
+          <p:nvPr/>
+        </p:nvSpPr>
+        <p:spPr>
+          <a:xfrm rot="5400000">
+            <a:off x="3229263" y="-23812"/>
+            <a:ext cx="985981" cy="4414981"/>
+          </a:xfrm>
+          <a:prstGeom prst="roundRect">
+            <a:avLst/>
+          </a:prstGeom>
+          <a:solidFill>
+            <a:schemeClr val="tx1">
+              <a:lumMod val="50000"/>
+              <a:lumOff val="50000"/>
+            </a:schemeClr>
+          </a:solidFill>
+        </p:spPr>
+        <p:style>
+          <a:lnRef idx="2">
+            <a:schemeClr val="accent1">
+              <a:shade val="15000"/>
+            </a:schemeClr>
+          </a:lnRef>
+          <a:fillRef idx="1">
+            <a:schemeClr val="accent1"/>
+          </a:fillRef>
+          <a:effectRef idx="0">
+            <a:schemeClr val="accent1"/>
+          </a:effectRef>
+          <a:fontRef idx="minor">
+            <a:schemeClr val="lt1"/>
+          </a:fontRef>
+        </p:style>
+        <p:txBody>
+          <a:bodyPr vert="vert270" rtlCol="0" anchor="ctr"/>
+          <a:lstStyle/>
+          <a:p>
+            <a:pPr algn="ctr"/>
+            <a:r>
+              <a:rPr lang="de-DE" dirty="0"/>
+              <a:t>Einzelzellenmodell</a:t>
+            </a:r>
+            <a:endParaRPr lang="en-US" dirty="0"/>
+          </a:p>
+        </p:txBody>
+      </p:sp>
+      <p:sp>
+        <p:nvSpPr>
+          <p:cNvPr id="7" name="Rechteck: abgerundete Ecken 6">
+            <a:extLst>
+              <a:ext uri="{FF2B5EF4-FFF2-40B4-BE49-F238E27FC236}">
+                <a16:creationId xmlns:a16="http://schemas.microsoft.com/office/drawing/2014/main" id="{BC32EB1F-B689-FAD6-9F4E-4651DA727382}"/>
+              </a:ext>
+            </a:extLst>
+          </p:cNvPr>
+          <p:cNvSpPr/>
+          <p:nvPr/>
+        </p:nvSpPr>
+        <p:spPr>
+          <a:xfrm>
+            <a:off x="1161473" y="5819121"/>
+            <a:ext cx="2914072" cy="821603"/>
+          </a:xfrm>
+          <a:prstGeom prst="roundRect">
+            <a:avLst/>
+          </a:prstGeom>
+        </p:spPr>
+        <p:style>
+          <a:lnRef idx="2">
+            <a:schemeClr val="accent1">
+              <a:shade val="15000"/>
+            </a:schemeClr>
+          </a:lnRef>
+          <a:fillRef idx="1">
+            <a:schemeClr val="accent1"/>
+          </a:fillRef>
+          <a:effectRef idx="0">
+            <a:schemeClr val="accent1"/>
+          </a:effectRef>
+          <a:fontRef idx="minor">
+            <a:schemeClr val="lt1"/>
+          </a:fontRef>
+        </p:style>
+        <p:txBody>
+          <a:bodyPr rtlCol="0" anchor="ctr"/>
+          <a:lstStyle/>
+          <a:p>
+            <a:pPr algn="ctr"/>
+            <a:r>
+              <a:rPr lang="de-DE" dirty="0"/>
+              <a:t>Degradationseffekte</a:t>
+            </a:r>
+            <a:endParaRPr lang="en-US" dirty="0"/>
+          </a:p>
+        </p:txBody>
+      </p:sp>
+      <p:sp>
+        <p:nvSpPr>
+          <p:cNvPr id="9" name="Rechteck: abgerundete Ecken 8">
+            <a:extLst>
+              <a:ext uri="{FF2B5EF4-FFF2-40B4-BE49-F238E27FC236}">
+                <a16:creationId xmlns:a16="http://schemas.microsoft.com/office/drawing/2014/main" id="{78417AB9-F313-2AB8-69F1-8BADBE9B88DF}"/>
+              </a:ext>
+            </a:extLst>
+          </p:cNvPr>
+          <p:cNvSpPr/>
+          <p:nvPr/>
+        </p:nvSpPr>
+        <p:spPr>
+          <a:xfrm>
+            <a:off x="3873500" y="4517593"/>
+            <a:ext cx="3168072" cy="821603"/>
+          </a:xfrm>
+          <a:prstGeom prst="roundRect">
+            <a:avLst/>
+          </a:prstGeom>
+        </p:spPr>
+        <p:style>
+          <a:lnRef idx="2">
+            <a:schemeClr val="accent1">
+              <a:shade val="15000"/>
+            </a:schemeClr>
+          </a:lnRef>
+          <a:fillRef idx="1">
+            <a:schemeClr val="accent1"/>
+          </a:fillRef>
+          <a:effectRef idx="0">
+            <a:schemeClr val="accent1"/>
+          </a:effectRef>
+          <a:fontRef idx="minor">
+            <a:schemeClr val="lt1"/>
+          </a:fontRef>
+        </p:style>
+        <p:txBody>
+          <a:bodyPr rtlCol="0" anchor="ctr"/>
+          <a:lstStyle/>
+          <a:p>
+            <a:pPr algn="ctr"/>
+            <a:r>
+              <a:rPr lang="de-DE" dirty="0"/>
+              <a:t>Diffusionsmodelle </a:t>
+            </a:r>
+          </a:p>
+          <a:p>
+            <a:pPr algn="ctr"/>
+            <a:r>
+              <a:rPr lang="de-DE" dirty="0"/>
+              <a:t>(LBM-Integration)</a:t>
+            </a:r>
+            <a:endParaRPr lang="en-US" dirty="0"/>
+          </a:p>
+        </p:txBody>
+      </p:sp>
+      <p:sp>
+        <p:nvSpPr>
+          <p:cNvPr id="10" name="Rechteck: abgerundete Ecken 9">
+            <a:extLst>
+              <a:ext uri="{FF2B5EF4-FFF2-40B4-BE49-F238E27FC236}">
+                <a16:creationId xmlns:a16="http://schemas.microsoft.com/office/drawing/2014/main" id="{9FBB65EF-7D69-800B-35EB-5F50EE901E47}"/>
+              </a:ext>
+            </a:extLst>
+          </p:cNvPr>
+          <p:cNvSpPr/>
+          <p:nvPr/>
+        </p:nvSpPr>
+        <p:spPr>
+          <a:xfrm rot="5400000">
+            <a:off x="3229264" y="1129867"/>
+            <a:ext cx="985981" cy="4414981"/>
+          </a:xfrm>
+          <a:prstGeom prst="roundRect">
+            <a:avLst/>
+          </a:prstGeom>
+          <a:solidFill>
+            <a:schemeClr val="accent3"/>
+          </a:solidFill>
+        </p:spPr>
+        <p:style>
+          <a:lnRef idx="2">
+            <a:schemeClr val="accent1">
+              <a:shade val="15000"/>
+            </a:schemeClr>
+          </a:lnRef>
+          <a:fillRef idx="1">
+            <a:schemeClr val="accent1"/>
+          </a:fillRef>
+          <a:effectRef idx="0">
+            <a:schemeClr val="accent1"/>
+          </a:effectRef>
+          <a:fontRef idx="minor">
+            <a:schemeClr val="lt1"/>
+          </a:fontRef>
+        </p:style>
+        <p:txBody>
+          <a:bodyPr vert="vert270" rtlCol="0" anchor="ctr"/>
+          <a:lstStyle/>
+          <a:p>
+            <a:pPr algn="ctr"/>
+            <a:r>
+              <a:rPr lang="de-DE" dirty="0"/>
+              <a:t>Validierung des Modells durch experimentelle Daten</a:t>
+            </a:r>
+            <a:endParaRPr lang="en-US" dirty="0"/>
+          </a:p>
+        </p:txBody>
+      </p:sp>
+      <p:sp>
+        <p:nvSpPr>
+          <p:cNvPr id="15" name="Rechteck: abgerundete Ecken 14">
+            <a:extLst>
+              <a:ext uri="{FF2B5EF4-FFF2-40B4-BE49-F238E27FC236}">
+                <a16:creationId xmlns:a16="http://schemas.microsoft.com/office/drawing/2014/main" id="{8AE689DA-F22A-23D0-EF7C-28EF7FF17B88}"/>
+              </a:ext>
+            </a:extLst>
+          </p:cNvPr>
+          <p:cNvSpPr/>
+          <p:nvPr/>
+        </p:nvSpPr>
+        <p:spPr>
+          <a:xfrm>
+            <a:off x="592570" y="4405527"/>
+            <a:ext cx="2788804" cy="821603"/>
+          </a:xfrm>
+          <a:prstGeom prst="roundRect">
+            <a:avLst/>
+          </a:prstGeom>
+        </p:spPr>
+        <p:style>
+          <a:lnRef idx="2">
+            <a:schemeClr val="accent1">
+              <a:shade val="15000"/>
+            </a:schemeClr>
+          </a:lnRef>
+          <a:fillRef idx="1">
+            <a:schemeClr val="accent1"/>
+          </a:fillRef>
+          <a:effectRef idx="0">
+            <a:schemeClr val="accent1"/>
+          </a:effectRef>
+          <a:fontRef idx="minor">
+            <a:schemeClr val="lt1"/>
+          </a:fontRef>
+        </p:style>
+        <p:txBody>
+          <a:bodyPr rtlCol="0" anchor="ctr"/>
+          <a:lstStyle/>
+          <a:p>
+            <a:pPr algn="ctr"/>
+            <a:r>
+              <a:rPr lang="de-DE" dirty="0"/>
+              <a:t>Erweiterung SOEC/</a:t>
+            </a:r>
+            <a:r>
+              <a:rPr lang="de-DE" dirty="0" err="1"/>
+              <a:t>rSOC</a:t>
+            </a:r>
+            <a:endParaRPr lang="en-US" dirty="0"/>
+          </a:p>
+        </p:txBody>
+      </p:sp>
+      <p:sp>
+        <p:nvSpPr>
+          <p:cNvPr id="16" name="Rechteck: abgerundete Ecken 15">
+            <a:extLst>
+              <a:ext uri="{FF2B5EF4-FFF2-40B4-BE49-F238E27FC236}">
+                <a16:creationId xmlns:a16="http://schemas.microsoft.com/office/drawing/2014/main" id="{049F65BC-FC16-8F55-295C-FC1423BDEC6B}"/>
+              </a:ext>
+            </a:extLst>
+          </p:cNvPr>
+          <p:cNvSpPr/>
+          <p:nvPr/>
+        </p:nvSpPr>
+        <p:spPr>
+          <a:xfrm>
+            <a:off x="6631710" y="5819122"/>
+            <a:ext cx="3168072" cy="821603"/>
+          </a:xfrm>
+          <a:prstGeom prst="roundRect">
+            <a:avLst/>
+          </a:prstGeom>
+        </p:spPr>
+        <p:style>
+          <a:lnRef idx="2">
+            <a:schemeClr val="accent1">
+              <a:shade val="15000"/>
+            </a:schemeClr>
+          </a:lnRef>
+          <a:fillRef idx="1">
+            <a:schemeClr val="accent1"/>
+          </a:fillRef>
+          <a:effectRef idx="0">
+            <a:schemeClr val="accent1"/>
+          </a:effectRef>
+          <a:fontRef idx="minor">
+            <a:schemeClr val="lt1"/>
+          </a:fontRef>
+        </p:style>
+        <p:txBody>
+          <a:bodyPr rtlCol="0" anchor="ctr"/>
+          <a:lstStyle/>
+          <a:p>
+            <a:pPr algn="ctr"/>
+            <a:r>
+              <a:rPr lang="de-DE" dirty="0"/>
+              <a:t>Temperaturabhängigkeiten</a:t>
+            </a:r>
+            <a:endParaRPr lang="en-US" dirty="0"/>
+          </a:p>
+        </p:txBody>
+      </p:sp>
+      <p:sp>
+        <p:nvSpPr>
+          <p:cNvPr id="18" name="Rechteck: abgerundete Ecken 17">
+            <a:extLst>
+              <a:ext uri="{FF2B5EF4-FFF2-40B4-BE49-F238E27FC236}">
+                <a16:creationId xmlns:a16="http://schemas.microsoft.com/office/drawing/2014/main" id="{B3054DEF-35AA-2F24-3D2A-84E381F3B3C0}"/>
+              </a:ext>
+            </a:extLst>
+          </p:cNvPr>
+          <p:cNvSpPr/>
+          <p:nvPr/>
+        </p:nvSpPr>
+        <p:spPr>
+          <a:xfrm>
+            <a:off x="7227453" y="4433453"/>
+            <a:ext cx="3168072" cy="821603"/>
+          </a:xfrm>
+          <a:prstGeom prst="roundRect">
+            <a:avLst/>
+          </a:prstGeom>
+        </p:spPr>
+        <p:style>
+          <a:lnRef idx="2">
+            <a:schemeClr val="accent1">
+              <a:shade val="15000"/>
+            </a:schemeClr>
+          </a:lnRef>
+          <a:fillRef idx="1">
+            <a:schemeClr val="accent1"/>
+          </a:fillRef>
+          <a:effectRef idx="0">
+            <a:schemeClr val="accent1"/>
+          </a:effectRef>
+          <a:fontRef idx="minor">
+            <a:schemeClr val="lt1"/>
+          </a:fontRef>
+        </p:style>
+        <p:txBody>
+          <a:bodyPr rtlCol="0" anchor="ctr"/>
+          <a:lstStyle/>
+          <a:p>
+            <a:pPr algn="ctr"/>
+            <a:r>
+              <a:rPr lang="de-DE" dirty="0"/>
+              <a:t>Kinetisches Modell</a:t>
+            </a:r>
+            <a:endParaRPr lang="en-US" dirty="0"/>
+          </a:p>
+        </p:txBody>
+      </p:sp>
+      <p:cxnSp>
+        <p:nvCxnSpPr>
+          <p:cNvPr id="20" name="Gerade Verbindung mit Pfeil 19">
+            <a:extLst>
+              <a:ext uri="{FF2B5EF4-FFF2-40B4-BE49-F238E27FC236}">
+                <a16:creationId xmlns:a16="http://schemas.microsoft.com/office/drawing/2014/main" id="{3D9709A4-9746-C1A8-BD29-09AA10E2F793}"/>
+              </a:ext>
+            </a:extLst>
+          </p:cNvPr>
+          <p:cNvCxnSpPr>
+            <a:stCxn id="6" idx="3"/>
+            <a:endCxn id="10" idx="1"/>
+          </p:cNvCxnSpPr>
+          <p:nvPr/>
+        </p:nvCxnSpPr>
+        <p:spPr>
+          <a:xfrm>
+            <a:off x="3722253" y="2676669"/>
+            <a:ext cx="1" cy="167698"/>
+          </a:xfrm>
+          <a:prstGeom prst="straightConnector1">
+            <a:avLst/>
+          </a:prstGeom>
+          <a:ln w="57150">
+            <a:tailEnd type="triangle"/>
+          </a:ln>
+        </p:spPr>
+        <p:style>
+          <a:lnRef idx="2">
+            <a:schemeClr val="accent1"/>
+          </a:lnRef>
+          <a:fillRef idx="0">
+            <a:schemeClr val="accent1"/>
+          </a:fillRef>
+          <a:effectRef idx="1">
+            <a:schemeClr val="accent1"/>
+          </a:effectRef>
+          <a:fontRef idx="minor">
+            <a:schemeClr val="tx1"/>
+          </a:fontRef>
+        </p:style>
+      </p:cxnSp>
+      <p:cxnSp>
+        <p:nvCxnSpPr>
+          <p:cNvPr id="23" name="Verbinder: gekrümmt 22">
+            <a:extLst>
+              <a:ext uri="{FF2B5EF4-FFF2-40B4-BE49-F238E27FC236}">
+                <a16:creationId xmlns:a16="http://schemas.microsoft.com/office/drawing/2014/main" id="{71624F3F-86B4-787B-78A1-9D9D4F3E1519}"/>
+              </a:ext>
+            </a:extLst>
+          </p:cNvPr>
+          <p:cNvCxnSpPr>
+            <a:stCxn id="10" idx="3"/>
+            <a:endCxn id="7" idx="0"/>
+          </p:cNvCxnSpPr>
+          <p:nvPr/>
+        </p:nvCxnSpPr>
+        <p:spPr>
+          <a:xfrm rot="5400000">
+            <a:off x="2175996" y="4272862"/>
+            <a:ext cx="1988773" cy="1103745"/>
+          </a:xfrm>
+          <a:prstGeom prst="curvedConnector3">
+            <a:avLst>
+              <a:gd name="adj1" fmla="val 80188"/>
+            </a:avLst>
+          </a:prstGeom>
+          <a:ln w="57150">
+            <a:solidFill>
+              <a:schemeClr val="accent2"/>
+            </a:solidFill>
+            <a:tailEnd type="triangle"/>
+          </a:ln>
+        </p:spPr>
+        <p:style>
+          <a:lnRef idx="2">
+            <a:schemeClr val="accent1"/>
+          </a:lnRef>
+          <a:fillRef idx="0">
+            <a:schemeClr val="accent1"/>
+          </a:fillRef>
+          <a:effectRef idx="1">
+            <a:schemeClr val="accent1"/>
+          </a:effectRef>
+          <a:fontRef idx="minor">
+            <a:schemeClr val="tx1"/>
+          </a:fontRef>
+        </p:style>
+      </p:cxnSp>
+      <p:cxnSp>
+        <p:nvCxnSpPr>
+          <p:cNvPr id="25" name="Verbinder: gekrümmt 24">
+            <a:extLst>
+              <a:ext uri="{FF2B5EF4-FFF2-40B4-BE49-F238E27FC236}">
+                <a16:creationId xmlns:a16="http://schemas.microsoft.com/office/drawing/2014/main" id="{C0D27023-6370-5BD6-8441-442BE815AB56}"/>
+              </a:ext>
+            </a:extLst>
+          </p:cNvPr>
+          <p:cNvCxnSpPr>
+            <a:cxnSpLocks/>
+            <a:stCxn id="10" idx="3"/>
+            <a:endCxn id="9" idx="0"/>
+          </p:cNvCxnSpPr>
+          <p:nvPr/>
+        </p:nvCxnSpPr>
+        <p:spPr>
+          <a:xfrm rot="16200000" flipH="1">
+            <a:off x="4246273" y="3306329"/>
+            <a:ext cx="687245" cy="1735282"/>
+          </a:xfrm>
+          <a:prstGeom prst="curvedConnector5">
+            <a:avLst>
+              <a:gd name="adj1" fmla="val 33263"/>
+              <a:gd name="adj2" fmla="val 204458"/>
+              <a:gd name="adj3" fmla="val 66737"/>
+            </a:avLst>
+          </a:prstGeom>
+          <a:ln w="57150">
+            <a:solidFill>
+              <a:schemeClr val="accent2"/>
+            </a:solidFill>
+            <a:tailEnd type="triangle"/>
+          </a:ln>
+        </p:spPr>
+        <p:style>
+          <a:lnRef idx="2">
+            <a:schemeClr val="accent1"/>
+          </a:lnRef>
+          <a:fillRef idx="0">
+            <a:schemeClr val="accent1"/>
+          </a:fillRef>
+          <a:effectRef idx="1">
+            <a:schemeClr val="accent1"/>
+          </a:effectRef>
+          <a:fontRef idx="minor">
+            <a:schemeClr val="tx1"/>
+          </a:fontRef>
+        </p:style>
+      </p:cxnSp>
+      <p:cxnSp>
+        <p:nvCxnSpPr>
+          <p:cNvPr id="28" name="Verbinder: gekrümmt 27">
+            <a:extLst>
+              <a:ext uri="{FF2B5EF4-FFF2-40B4-BE49-F238E27FC236}">
+                <a16:creationId xmlns:a16="http://schemas.microsoft.com/office/drawing/2014/main" id="{23C5F835-0E03-0E4B-1956-807ED3635C6B}"/>
+              </a:ext>
+            </a:extLst>
+          </p:cNvPr>
+          <p:cNvCxnSpPr>
+            <a:cxnSpLocks/>
+            <a:stCxn id="10" idx="3"/>
+          </p:cNvCxnSpPr>
+          <p:nvPr/>
+        </p:nvCxnSpPr>
+        <p:spPr>
+          <a:xfrm rot="16200000" flipH="1">
+            <a:off x="5113914" y="2438688"/>
+            <a:ext cx="565438" cy="3348758"/>
+          </a:xfrm>
+          <a:prstGeom prst="curvedConnector4">
+            <a:avLst>
+              <a:gd name="adj1" fmla="val 40429"/>
+              <a:gd name="adj2" fmla="val 57361"/>
+            </a:avLst>
+          </a:prstGeom>
+          <a:ln w="57150">
+            <a:solidFill>
+              <a:schemeClr val="accent2"/>
+            </a:solidFill>
+            <a:tailEnd type="triangle"/>
+          </a:ln>
+        </p:spPr>
+        <p:style>
+          <a:lnRef idx="2">
+            <a:schemeClr val="accent1"/>
+          </a:lnRef>
+          <a:fillRef idx="0">
+            <a:schemeClr val="accent1"/>
+          </a:fillRef>
+          <a:effectRef idx="1">
+            <a:schemeClr val="accent1"/>
+          </a:effectRef>
+          <a:fontRef idx="minor">
+            <a:schemeClr val="tx1"/>
+          </a:fontRef>
+        </p:style>
+      </p:cxnSp>
+      <p:cxnSp>
+        <p:nvCxnSpPr>
+          <p:cNvPr id="34" name="Verbinder: gekrümmt 33">
+            <a:extLst>
+              <a:ext uri="{FF2B5EF4-FFF2-40B4-BE49-F238E27FC236}">
+                <a16:creationId xmlns:a16="http://schemas.microsoft.com/office/drawing/2014/main" id="{D1C74ED5-A1AB-FDD9-ECC5-04870F789CFE}"/>
+              </a:ext>
+            </a:extLst>
+          </p:cNvPr>
+          <p:cNvCxnSpPr>
+            <a:cxnSpLocks/>
+            <a:stCxn id="10" idx="3"/>
+            <a:endCxn id="15" idx="0"/>
+          </p:cNvCxnSpPr>
+          <p:nvPr/>
+        </p:nvCxnSpPr>
+        <p:spPr>
+          <a:xfrm rot="5400000">
+            <a:off x="2567024" y="3250296"/>
+            <a:ext cx="575179" cy="1735282"/>
+          </a:xfrm>
+          <a:prstGeom prst="curvedConnector5">
+            <a:avLst>
+              <a:gd name="adj1" fmla="val 39744"/>
+              <a:gd name="adj2" fmla="val 71640"/>
+              <a:gd name="adj3" fmla="val 60256"/>
+            </a:avLst>
+          </a:prstGeom>
+          <a:ln w="57150">
+            <a:solidFill>
+              <a:schemeClr val="accent2"/>
+            </a:solidFill>
+            <a:tailEnd type="triangle"/>
+          </a:ln>
+        </p:spPr>
+        <p:style>
+          <a:lnRef idx="2">
+            <a:schemeClr val="accent1"/>
+          </a:lnRef>
+          <a:fillRef idx="0">
+            <a:schemeClr val="accent1"/>
+          </a:fillRef>
+          <a:effectRef idx="1">
+            <a:schemeClr val="accent1"/>
+          </a:effectRef>
+          <a:fontRef idx="minor">
+            <a:schemeClr val="tx1"/>
+          </a:fontRef>
+        </p:style>
+      </p:cxnSp>
+      <p:cxnSp>
+        <p:nvCxnSpPr>
+          <p:cNvPr id="38" name="Verbinder: gekrümmt 37">
+            <a:extLst>
+              <a:ext uri="{FF2B5EF4-FFF2-40B4-BE49-F238E27FC236}">
+                <a16:creationId xmlns:a16="http://schemas.microsoft.com/office/drawing/2014/main" id="{792B06A2-2003-AB80-FDE8-9FC77D7D154C}"/>
+              </a:ext>
+            </a:extLst>
+          </p:cNvPr>
+          <p:cNvCxnSpPr>
+            <a:cxnSpLocks/>
+            <a:stCxn id="10" idx="3"/>
+            <a:endCxn id="16" idx="1"/>
+          </p:cNvCxnSpPr>
+          <p:nvPr/>
+        </p:nvCxnSpPr>
+        <p:spPr>
+          <a:xfrm rot="16200000" flipH="1">
+            <a:off x="3977194" y="3575408"/>
+            <a:ext cx="2399576" cy="2909456"/>
+          </a:xfrm>
+          <a:prstGeom prst="curvedConnector2">
+            <a:avLst/>
+          </a:prstGeom>
+          <a:ln w="57150">
+            <a:solidFill>
+              <a:schemeClr val="accent2"/>
+            </a:solidFill>
+            <a:tailEnd type="triangle"/>
+          </a:ln>
+        </p:spPr>
+        <p:style>
+          <a:lnRef idx="2">
+            <a:schemeClr val="accent1"/>
+          </a:lnRef>
+          <a:fillRef idx="0">
+            <a:schemeClr val="accent1"/>
+          </a:fillRef>
+          <a:effectRef idx="1">
+            <a:schemeClr val="accent1"/>
+          </a:effectRef>
+          <a:fontRef idx="minor">
+            <a:schemeClr val="tx1"/>
+          </a:fontRef>
+        </p:style>
+      </p:cxnSp>
+      <p:cxnSp>
+        <p:nvCxnSpPr>
+          <p:cNvPr id="41" name="Verbinder: gekrümmt 40">
+            <a:extLst>
+              <a:ext uri="{FF2B5EF4-FFF2-40B4-BE49-F238E27FC236}">
+                <a16:creationId xmlns:a16="http://schemas.microsoft.com/office/drawing/2014/main" id="{BF2441AA-7904-0A84-B643-3CA798DA78AB}"/>
+              </a:ext>
+            </a:extLst>
+          </p:cNvPr>
+          <p:cNvCxnSpPr>
+            <a:cxnSpLocks/>
+            <a:stCxn id="10" idx="3"/>
+            <a:endCxn id="18" idx="0"/>
+          </p:cNvCxnSpPr>
+          <p:nvPr/>
+        </p:nvCxnSpPr>
+        <p:spPr>
+          <a:xfrm rot="16200000" flipH="1">
+            <a:off x="5965319" y="1587282"/>
+            <a:ext cx="603105" cy="5089235"/>
+          </a:xfrm>
+          <a:prstGeom prst="curvedConnector5">
+            <a:avLst>
+              <a:gd name="adj1" fmla="val 37904"/>
+              <a:gd name="adj2" fmla="val 39281"/>
+              <a:gd name="adj3" fmla="val 62096"/>
+            </a:avLst>
+          </a:prstGeom>
+          <a:ln w="57150">
+            <a:solidFill>
+              <a:schemeClr val="accent2"/>
+            </a:solidFill>
+            <a:tailEnd type="triangle"/>
+          </a:ln>
+        </p:spPr>
+        <p:style>
+          <a:lnRef idx="2">
+            <a:schemeClr val="accent1"/>
+          </a:lnRef>
+          <a:fillRef idx="0">
+            <a:schemeClr val="accent1"/>
+          </a:fillRef>
+          <a:effectRef idx="1">
+            <a:schemeClr val="accent1"/>
+          </a:effectRef>
+          <a:fontRef idx="minor">
+            <a:schemeClr val="tx1"/>
+          </a:fontRef>
+        </p:style>
+      </p:cxnSp>
+      <p:sp>
+        <p:nvSpPr>
+          <p:cNvPr id="44" name="Geschweifte Klammer rechts 43">
+            <a:extLst>
+              <a:ext uri="{FF2B5EF4-FFF2-40B4-BE49-F238E27FC236}">
+                <a16:creationId xmlns:a16="http://schemas.microsoft.com/office/drawing/2014/main" id="{C45B32CD-13CF-9408-D4A5-125C2FD310F8}"/>
+              </a:ext>
+            </a:extLst>
+          </p:cNvPr>
+          <p:cNvSpPr/>
+          <p:nvPr/>
+        </p:nvSpPr>
+        <p:spPr>
+          <a:xfrm>
+            <a:off x="10280073" y="4173970"/>
+            <a:ext cx="572654" cy="2399577"/>
+          </a:xfrm>
+          <a:prstGeom prst="rightBrace">
+            <a:avLst/>
+          </a:prstGeom>
+          <a:ln w="57150">
+            <a:solidFill>
+              <a:schemeClr val="accent2"/>
+            </a:solidFill>
+          </a:ln>
+        </p:spPr>
+        <p:style>
+          <a:lnRef idx="2">
+            <a:schemeClr val="accent1"/>
+          </a:lnRef>
+          <a:fillRef idx="0">
+            <a:schemeClr val="accent1"/>
+          </a:fillRef>
+          <a:effectRef idx="1">
+            <a:schemeClr val="accent1"/>
+          </a:effectRef>
+          <a:fontRef idx="minor">
+            <a:schemeClr val="tx1"/>
+          </a:fontRef>
+        </p:style>
+        <p:txBody>
+          <a:bodyPr rtlCol="0" anchor="ctr"/>
+          <a:lstStyle/>
+          <a:p>
+            <a:pPr algn="ctr"/>
+            <a:endParaRPr lang="en-US"/>
+          </a:p>
+        </p:txBody>
+      </p:sp>
+      <p:cxnSp>
+        <p:nvCxnSpPr>
+          <p:cNvPr id="45" name="Verbinder: gekrümmt 44">
+            <a:extLst>
+              <a:ext uri="{FF2B5EF4-FFF2-40B4-BE49-F238E27FC236}">
+                <a16:creationId xmlns:a16="http://schemas.microsoft.com/office/drawing/2014/main" id="{C2576876-B501-4F62-A8A3-9F83F98C4E0D}"/>
+              </a:ext>
+            </a:extLst>
+          </p:cNvPr>
+          <p:cNvCxnSpPr>
+            <a:cxnSpLocks/>
+            <a:stCxn id="44" idx="1"/>
+            <a:endCxn id="10" idx="0"/>
+          </p:cNvCxnSpPr>
+          <p:nvPr/>
+        </p:nvCxnSpPr>
+        <p:spPr>
+          <a:xfrm rot="10800000">
+            <a:off x="5929745" y="3337359"/>
+            <a:ext cx="4922982" cy="2036401"/>
+          </a:xfrm>
+          <a:prstGeom prst="curvedConnector3">
+            <a:avLst>
+              <a:gd name="adj1" fmla="val -20732"/>
+            </a:avLst>
+          </a:prstGeom>
+          <a:ln w="57150">
+            <a:solidFill>
+              <a:schemeClr val="accent2"/>
+            </a:solidFill>
+            <a:tailEnd type="triangle"/>
+          </a:ln>
+        </p:spPr>
+        <p:style>
+          <a:lnRef idx="2">
+            <a:schemeClr val="accent1"/>
+          </a:lnRef>
+          <a:fillRef idx="0">
+            <a:schemeClr val="accent1"/>
+          </a:fillRef>
+          <a:effectRef idx="1">
+            <a:schemeClr val="accent1"/>
+          </a:effectRef>
+          <a:fontRef idx="minor">
+            <a:schemeClr val="tx1"/>
+          </a:fontRef>
+        </p:style>
+      </p:cxnSp>
+      <p:sp>
+        <p:nvSpPr>
+          <p:cNvPr id="50" name="Textfeld 49">
+            <a:extLst>
+              <a:ext uri="{FF2B5EF4-FFF2-40B4-BE49-F238E27FC236}">
+                <a16:creationId xmlns:a16="http://schemas.microsoft.com/office/drawing/2014/main" id="{0003CE93-2E6F-66C3-D78B-767302134E65}"/>
+              </a:ext>
+            </a:extLst>
+          </p:cNvPr>
+          <p:cNvSpPr txBox="1"/>
+          <p:nvPr/>
+        </p:nvSpPr>
+        <p:spPr>
+          <a:xfrm>
+            <a:off x="6339507" y="1560678"/>
+            <a:ext cx="5221274" cy="923330"/>
+          </a:xfrm>
+          <a:prstGeom prst="rect">
+            <a:avLst/>
+          </a:prstGeom>
+          <a:noFill/>
+        </p:spPr>
+        <p:txBody>
+          <a:bodyPr wrap="square" rtlCol="0">
+            <a:spAutoFit/>
+          </a:bodyPr>
+          <a:lstStyle/>
+          <a:p>
+            <a:r>
+              <a:rPr lang="de-DE" dirty="0"/>
+              <a:t>Die Möglichkeiten zur Erweiterung und Verbesserung sind Vielfältig. Aktuell möchte ich mich noch nicht festlegen.</a:t>
+            </a:r>
+            <a:endParaRPr lang="en-US" dirty="0"/>
+          </a:p>
+        </p:txBody>
+      </p:sp>
+    </p:spTree>
+    <p:extLst>
+      <p:ext uri="{BB962C8B-B14F-4D97-AF65-F5344CB8AC3E}">
+        <p14:creationId xmlns:p14="http://schemas.microsoft.com/office/powerpoint/2010/main" val="3862067428"/>
+      </p:ext>
+    </p:extLst>
+  </p:cSld>
+  <p:clrMapOvr>
+    <a:masterClrMapping/>
+  </p:clrMapOvr>
+</p:sld>
+</file>
+
+<file path=ppt/slides/slide8.xml><?xml version="1.0" encoding="utf-8"?>
+<p:sld xmlns:a="http://schemas.openxmlformats.org/drawingml/2006/main" xmlns:r="http://schemas.openxmlformats.org/officeDocument/2006/relationships" xmlns:p="http://schemas.openxmlformats.org/presentationml/2006/main">
+  <p:cSld>
+    <p:spTree>
+      <p:nvGrpSpPr>
+        <p:cNvPr id="1" name=""/>
+        <p:cNvGrpSpPr/>
+        <p:nvPr/>
+      </p:nvGrpSpPr>
+      <p:grpSpPr>
+        <a:xfrm>
+          <a:off x="0" y="0"/>
+          <a:ext cx="0" cy="0"/>
+          <a:chOff x="0" y="0"/>
+          <a:chExt cx="0" cy="0"/>
+        </a:xfrm>
+      </p:grpSpPr>
       <p:grpSp>
         <p:nvGrpSpPr>
           <p:cNvPr id="15" name="Gruppieren 14">
@@ -5194,7 +8806,7 @@
 </p:sld>
 </file>
 
-<file path=ppt/slides/slide2.xml><?xml version="1.0" encoding="utf-8"?>
+<file path=ppt/slides/slide9.xml><?xml version="1.0" encoding="utf-8"?>
 <p:sld xmlns:a="http://schemas.openxmlformats.org/drawingml/2006/main" xmlns:r="http://schemas.openxmlformats.org/officeDocument/2006/relationships" xmlns:p="http://schemas.openxmlformats.org/presentationml/2006/main">
   <p:cSld>
     <p:spTree>
@@ -5216,7 +8828,7 @@
           <p:cNvPr id="2" name="Titel 1">
             <a:extLst>
               <a:ext uri="{FF2B5EF4-FFF2-40B4-BE49-F238E27FC236}">
-                <a16:creationId xmlns:a16="http://schemas.microsoft.com/office/drawing/2014/main" id="{8F5BBBEC-54B4-30A5-2159-848ADDA8FEE7}"/>
+                <a16:creationId xmlns:a16="http://schemas.microsoft.com/office/drawing/2014/main" id="{0B386DDC-E429-7434-513B-9F8F98550C2D}"/>
               </a:ext>
             </a:extLst>
           </p:cNvPr>
@@ -5234,45 +8846,899 @@
           <a:p>
             <a:r>
               <a:rPr lang="de-DE" dirty="0"/>
-              <a:t>Zhu Paper</a:t>
+              <a:t>Derzeitige Aufgaben</a:t>
             </a:r>
             <a:endParaRPr lang="en-US" dirty="0"/>
           </a:p>
         </p:txBody>
       </p:sp>
-      <p:sp>
-        <p:nvSpPr>
-          <p:cNvPr id="3" name="Inhaltsplatzhalter 2">
-            <a:extLst>
-              <a:ext uri="{FF2B5EF4-FFF2-40B4-BE49-F238E27FC236}">
-                <a16:creationId xmlns:a16="http://schemas.microsoft.com/office/drawing/2014/main" id="{ECB6594E-8AFB-826B-514A-106DB8437427}"/>
-              </a:ext>
-            </a:extLst>
-          </p:cNvPr>
-          <p:cNvSpPr>
-            <a:spLocks noGrp="1"/>
-          </p:cNvSpPr>
-          <p:nvPr>
-            <p:ph idx="1"/>
-          </p:nvPr>
-        </p:nvSpPr>
-        <p:spPr/>
-        <p:txBody>
-          <a:bodyPr/>
-          <a:lstStyle/>
-          <a:p>
-            <a:r>
-              <a:rPr lang="de-DE" dirty="0"/>
-              <a:t>Es wird eine Konzentration an beiden Interfaces berechnet und dann eine Stromstärke dazu aufgelöst.</a:t>
-            </a:r>
-            <a:endParaRPr lang="en-US" dirty="0"/>
-          </a:p>
-        </p:txBody>
-      </p:sp>
+      <p:grpSp>
+        <p:nvGrpSpPr>
+          <p:cNvPr id="22" name="Gruppieren 21">
+            <a:extLst>
+              <a:ext uri="{FF2B5EF4-FFF2-40B4-BE49-F238E27FC236}">
+                <a16:creationId xmlns:a16="http://schemas.microsoft.com/office/drawing/2014/main" id="{FD542A4E-5E6C-E3BF-E783-94485F405B09}"/>
+              </a:ext>
+            </a:extLst>
+          </p:cNvPr>
+          <p:cNvGrpSpPr/>
+          <p:nvPr/>
+        </p:nvGrpSpPr>
+        <p:grpSpPr>
+          <a:xfrm>
+            <a:off x="736600" y="1690686"/>
+            <a:ext cx="10125364" cy="1738313"/>
+            <a:chOff x="838200" y="1690688"/>
+            <a:chExt cx="10125364" cy="900112"/>
+          </a:xfrm>
+        </p:grpSpPr>
+        <p:sp>
+          <p:nvSpPr>
+            <p:cNvPr id="3" name="Rechteck: abgerundete Ecken 2">
+              <a:extLst>
+                <a:ext uri="{FF2B5EF4-FFF2-40B4-BE49-F238E27FC236}">
+                  <a16:creationId xmlns:a16="http://schemas.microsoft.com/office/drawing/2014/main" id="{29A55075-91EC-C944-8C5C-7E6FCC9A0FBF}"/>
+                </a:ext>
+              </a:extLst>
+            </p:cNvPr>
+            <p:cNvSpPr/>
+            <p:nvPr/>
+          </p:nvSpPr>
+          <p:spPr>
+            <a:xfrm>
+              <a:off x="838200" y="1690688"/>
+              <a:ext cx="10125364" cy="900112"/>
+            </a:xfrm>
+            <a:prstGeom prst="roundRect">
+              <a:avLst/>
+            </a:prstGeom>
+            <a:solidFill>
+              <a:schemeClr val="accent1">
+                <a:lumMod val="50000"/>
+                <a:alpha val="80000"/>
+              </a:schemeClr>
+            </a:solidFill>
+            <a:ln>
+              <a:solidFill>
+                <a:schemeClr val="tx2">
+                  <a:lumMod val="90000"/>
+                  <a:lumOff val="10000"/>
+                </a:schemeClr>
+              </a:solidFill>
+            </a:ln>
+          </p:spPr>
+          <p:style>
+            <a:lnRef idx="2">
+              <a:schemeClr val="accent1">
+                <a:shade val="15000"/>
+              </a:schemeClr>
+            </a:lnRef>
+            <a:fillRef idx="1">
+              <a:schemeClr val="accent1"/>
+            </a:fillRef>
+            <a:effectRef idx="0">
+              <a:schemeClr val="accent1"/>
+            </a:effectRef>
+            <a:fontRef idx="minor">
+              <a:schemeClr val="lt1"/>
+            </a:fontRef>
+          </p:style>
+          <p:txBody>
+            <a:bodyPr rtlCol="0" anchor="t"/>
+            <a:lstStyle/>
+            <a:p>
+              <a:pPr algn="ctr"/>
+              <a:r>
+                <a:rPr lang="de-DE" sz="2800" b="1" dirty="0" err="1"/>
+                <a:t>HyDi.KWK</a:t>
+              </a:r>
+              <a:endParaRPr lang="en-US" sz="2800" b="1" dirty="0"/>
+            </a:p>
+          </p:txBody>
+        </p:sp>
+        <p:sp>
+          <p:nvSpPr>
+            <p:cNvPr id="4" name="Rechteck: abgerundete Ecken 3">
+              <a:extLst>
+                <a:ext uri="{FF2B5EF4-FFF2-40B4-BE49-F238E27FC236}">
+                  <a16:creationId xmlns:a16="http://schemas.microsoft.com/office/drawing/2014/main" id="{E060F754-3186-607B-A6E7-7E9591D9C39A}"/>
+                </a:ext>
+              </a:extLst>
+            </p:cNvPr>
+            <p:cNvSpPr/>
+            <p:nvPr/>
+          </p:nvSpPr>
+          <p:spPr>
+            <a:xfrm>
+              <a:off x="838200" y="2274022"/>
+              <a:ext cx="5972175" cy="316778"/>
+            </a:xfrm>
+            <a:prstGeom prst="roundRect">
+              <a:avLst/>
+            </a:prstGeom>
+            <a:solidFill>
+              <a:schemeClr val="tx2">
+                <a:lumMod val="75000"/>
+                <a:lumOff val="25000"/>
+                <a:alpha val="80000"/>
+              </a:schemeClr>
+            </a:solidFill>
+          </p:spPr>
+          <p:style>
+            <a:lnRef idx="2">
+              <a:schemeClr val="accent1">
+                <a:shade val="15000"/>
+              </a:schemeClr>
+            </a:lnRef>
+            <a:fillRef idx="1">
+              <a:schemeClr val="accent1"/>
+            </a:fillRef>
+            <a:effectRef idx="0">
+              <a:schemeClr val="accent1"/>
+            </a:effectRef>
+            <a:fontRef idx="minor">
+              <a:schemeClr val="lt1"/>
+            </a:fontRef>
+          </p:style>
+          <p:txBody>
+            <a:bodyPr rtlCol="0" anchor="ctr"/>
+            <a:lstStyle/>
+            <a:p>
+              <a:pPr algn="ctr"/>
+              <a:r>
+                <a:rPr lang="de-DE" dirty="0"/>
+                <a:t>Modellierung</a:t>
+              </a:r>
+              <a:endParaRPr lang="en-US" dirty="0"/>
+            </a:p>
+          </p:txBody>
+        </p:sp>
+        <p:sp>
+          <p:nvSpPr>
+            <p:cNvPr id="5" name="Rechteck: abgerundete Ecken 4">
+              <a:extLst>
+                <a:ext uri="{FF2B5EF4-FFF2-40B4-BE49-F238E27FC236}">
+                  <a16:creationId xmlns:a16="http://schemas.microsoft.com/office/drawing/2014/main" id="{C1E0C906-63F0-82EB-2D90-28C29E2C2C38}"/>
+                </a:ext>
+              </a:extLst>
+            </p:cNvPr>
+            <p:cNvSpPr/>
+            <p:nvPr/>
+          </p:nvSpPr>
+          <p:spPr>
+            <a:xfrm>
+              <a:off x="6810375" y="2274022"/>
+              <a:ext cx="3343562" cy="316778"/>
+            </a:xfrm>
+            <a:prstGeom prst="roundRect">
+              <a:avLst/>
+            </a:prstGeom>
+            <a:solidFill>
+              <a:schemeClr val="tx2">
+                <a:lumMod val="50000"/>
+                <a:lumOff val="50000"/>
+                <a:alpha val="80000"/>
+              </a:schemeClr>
+            </a:solidFill>
+          </p:spPr>
+          <p:style>
+            <a:lnRef idx="2">
+              <a:schemeClr val="accent1">
+                <a:shade val="15000"/>
+              </a:schemeClr>
+            </a:lnRef>
+            <a:fillRef idx="1">
+              <a:schemeClr val="accent1"/>
+            </a:fillRef>
+            <a:effectRef idx="0">
+              <a:schemeClr val="accent1"/>
+            </a:effectRef>
+            <a:fontRef idx="minor">
+              <a:schemeClr val="lt1"/>
+            </a:fontRef>
+          </p:style>
+          <p:txBody>
+            <a:bodyPr rtlCol="0" anchor="ctr"/>
+            <a:lstStyle/>
+            <a:p>
+              <a:pPr algn="ctr"/>
+              <a:r>
+                <a:rPr lang="de-DE" dirty="0"/>
+                <a:t>Ausschreibungen</a:t>
+              </a:r>
+              <a:endParaRPr lang="en-US" dirty="0"/>
+            </a:p>
+          </p:txBody>
+        </p:sp>
+        <p:sp>
+          <p:nvSpPr>
+            <p:cNvPr id="7" name="Rechteck: abgerundete Ecken 6">
+              <a:extLst>
+                <a:ext uri="{FF2B5EF4-FFF2-40B4-BE49-F238E27FC236}">
+                  <a16:creationId xmlns:a16="http://schemas.microsoft.com/office/drawing/2014/main" id="{4A8AF0C1-A29B-FFF9-65A1-D857A2E87AE6}"/>
+                </a:ext>
+              </a:extLst>
+            </p:cNvPr>
+            <p:cNvSpPr/>
+            <p:nvPr/>
+          </p:nvSpPr>
+          <p:spPr>
+            <a:xfrm>
+              <a:off x="10048876" y="2274022"/>
+              <a:ext cx="914688" cy="316778"/>
+            </a:xfrm>
+            <a:prstGeom prst="roundRect">
+              <a:avLst/>
+            </a:prstGeom>
+            <a:solidFill>
+              <a:schemeClr val="tx2">
+                <a:lumMod val="25000"/>
+                <a:lumOff val="75000"/>
+                <a:alpha val="80000"/>
+              </a:schemeClr>
+            </a:solidFill>
+          </p:spPr>
+          <p:style>
+            <a:lnRef idx="2">
+              <a:schemeClr val="accent1">
+                <a:shade val="15000"/>
+              </a:schemeClr>
+            </a:lnRef>
+            <a:fillRef idx="1">
+              <a:schemeClr val="accent1"/>
+            </a:fillRef>
+            <a:effectRef idx="0">
+              <a:schemeClr val="accent1"/>
+            </a:effectRef>
+            <a:fontRef idx="minor">
+              <a:schemeClr val="lt1"/>
+            </a:fontRef>
+          </p:style>
+          <p:txBody>
+            <a:bodyPr rtlCol="0" anchor="ctr"/>
+            <a:lstStyle/>
+            <a:p>
+              <a:pPr algn="ctr"/>
+              <a:r>
+                <a:rPr lang="de-DE" dirty="0"/>
+                <a:t>etc.</a:t>
+              </a:r>
+              <a:endParaRPr lang="en-US" dirty="0"/>
+            </a:p>
+          </p:txBody>
+        </p:sp>
+      </p:grpSp>
+      <p:grpSp>
+        <p:nvGrpSpPr>
+          <p:cNvPr id="23" name="Gruppieren 22">
+            <a:extLst>
+              <a:ext uri="{FF2B5EF4-FFF2-40B4-BE49-F238E27FC236}">
+                <a16:creationId xmlns:a16="http://schemas.microsoft.com/office/drawing/2014/main" id="{04B21867-CA0E-8C99-D820-7674A0027097}"/>
+              </a:ext>
+            </a:extLst>
+          </p:cNvPr>
+          <p:cNvGrpSpPr/>
+          <p:nvPr/>
+        </p:nvGrpSpPr>
+        <p:grpSpPr>
+          <a:xfrm>
+            <a:off x="736600" y="3560712"/>
+            <a:ext cx="10125364" cy="1223820"/>
+            <a:chOff x="838200" y="2968626"/>
+            <a:chExt cx="10125364" cy="900112"/>
+          </a:xfrm>
+        </p:grpSpPr>
+        <p:sp>
+          <p:nvSpPr>
+            <p:cNvPr id="6" name="Rechteck: abgerundete Ecken 5">
+              <a:extLst>
+                <a:ext uri="{FF2B5EF4-FFF2-40B4-BE49-F238E27FC236}">
+                  <a16:creationId xmlns:a16="http://schemas.microsoft.com/office/drawing/2014/main" id="{8C5C45BC-AA6E-E182-531F-4B83A0F0D97A}"/>
+                </a:ext>
+              </a:extLst>
+            </p:cNvPr>
+            <p:cNvSpPr/>
+            <p:nvPr/>
+          </p:nvSpPr>
+          <p:spPr>
+            <a:xfrm>
+              <a:off x="838200" y="2968626"/>
+              <a:ext cx="10125364" cy="900112"/>
+            </a:xfrm>
+            <a:prstGeom prst="roundRect">
+              <a:avLst/>
+            </a:prstGeom>
+            <a:solidFill>
+              <a:schemeClr val="accent5">
+                <a:alpha val="80000"/>
+              </a:schemeClr>
+            </a:solidFill>
+            <a:ln>
+              <a:solidFill>
+                <a:schemeClr val="tx2">
+                  <a:lumMod val="90000"/>
+                  <a:lumOff val="10000"/>
+                </a:schemeClr>
+              </a:solidFill>
+            </a:ln>
+          </p:spPr>
+          <p:style>
+            <a:lnRef idx="2">
+              <a:schemeClr val="accent1">
+                <a:shade val="15000"/>
+              </a:schemeClr>
+            </a:lnRef>
+            <a:fillRef idx="1">
+              <a:schemeClr val="accent1"/>
+            </a:fillRef>
+            <a:effectRef idx="0">
+              <a:schemeClr val="accent1"/>
+            </a:effectRef>
+            <a:fontRef idx="minor">
+              <a:schemeClr val="lt1"/>
+            </a:fontRef>
+          </p:style>
+          <p:txBody>
+            <a:bodyPr rtlCol="0" anchor="t"/>
+            <a:lstStyle/>
+            <a:p>
+              <a:pPr algn="ctr"/>
+              <a:r>
+                <a:rPr lang="de-DE" sz="2400" b="1" dirty="0"/>
+                <a:t>Nicht-wissenschaftliche Aufgaben</a:t>
+              </a:r>
+              <a:endParaRPr lang="en-US" sz="2400" b="1" dirty="0"/>
+            </a:p>
+          </p:txBody>
+        </p:sp>
+        <p:sp>
+          <p:nvSpPr>
+            <p:cNvPr id="12" name="Rechteck: abgerundete Ecken 11">
+              <a:extLst>
+                <a:ext uri="{FF2B5EF4-FFF2-40B4-BE49-F238E27FC236}">
+                  <a16:creationId xmlns:a16="http://schemas.microsoft.com/office/drawing/2014/main" id="{048E779D-5BB8-295E-D289-7AA3E159FAFB}"/>
+                </a:ext>
+              </a:extLst>
+            </p:cNvPr>
+            <p:cNvSpPr/>
+            <p:nvPr/>
+          </p:nvSpPr>
+          <p:spPr>
+            <a:xfrm>
+              <a:off x="838201" y="3551960"/>
+              <a:ext cx="3895724" cy="316778"/>
+            </a:xfrm>
+            <a:prstGeom prst="roundRect">
+              <a:avLst/>
+            </a:prstGeom>
+            <a:solidFill>
+              <a:schemeClr val="accent5">
+                <a:lumMod val="75000"/>
+                <a:alpha val="80000"/>
+              </a:schemeClr>
+            </a:solidFill>
+          </p:spPr>
+          <p:style>
+            <a:lnRef idx="2">
+              <a:schemeClr val="accent1">
+                <a:shade val="15000"/>
+              </a:schemeClr>
+            </a:lnRef>
+            <a:fillRef idx="1">
+              <a:schemeClr val="accent1"/>
+            </a:fillRef>
+            <a:effectRef idx="0">
+              <a:schemeClr val="accent1"/>
+            </a:effectRef>
+            <a:fontRef idx="minor">
+              <a:schemeClr val="lt1"/>
+            </a:fontRef>
+          </p:style>
+          <p:txBody>
+            <a:bodyPr rtlCol="0" anchor="ctr"/>
+            <a:lstStyle/>
+            <a:p>
+              <a:pPr algn="ctr"/>
+              <a:r>
+                <a:rPr lang="de-DE" dirty="0"/>
+                <a:t>IT-Administration</a:t>
+              </a:r>
+              <a:endParaRPr lang="en-US" dirty="0"/>
+            </a:p>
+          </p:txBody>
+        </p:sp>
+        <p:sp>
+          <p:nvSpPr>
+            <p:cNvPr id="13" name="Rechteck: abgerundete Ecken 12">
+              <a:extLst>
+                <a:ext uri="{FF2B5EF4-FFF2-40B4-BE49-F238E27FC236}">
+                  <a16:creationId xmlns:a16="http://schemas.microsoft.com/office/drawing/2014/main" id="{3882EE5F-53B6-F14D-599D-0BAFA131F75D}"/>
+                </a:ext>
+              </a:extLst>
+            </p:cNvPr>
+            <p:cNvSpPr/>
+            <p:nvPr/>
+          </p:nvSpPr>
+          <p:spPr>
+            <a:xfrm>
+              <a:off x="4733925" y="3551960"/>
+              <a:ext cx="1514475" cy="316778"/>
+            </a:xfrm>
+            <a:prstGeom prst="roundRect">
+              <a:avLst/>
+            </a:prstGeom>
+            <a:solidFill>
+              <a:schemeClr val="accent5">
+                <a:lumMod val="60000"/>
+                <a:lumOff val="40000"/>
+                <a:alpha val="80000"/>
+              </a:schemeClr>
+            </a:solidFill>
+          </p:spPr>
+          <p:style>
+            <a:lnRef idx="2">
+              <a:schemeClr val="accent1">
+                <a:shade val="15000"/>
+              </a:schemeClr>
+            </a:lnRef>
+            <a:fillRef idx="1">
+              <a:schemeClr val="accent1"/>
+            </a:fillRef>
+            <a:effectRef idx="0">
+              <a:schemeClr val="accent1"/>
+            </a:effectRef>
+            <a:fontRef idx="minor">
+              <a:schemeClr val="lt1"/>
+            </a:fontRef>
+          </p:style>
+          <p:txBody>
+            <a:bodyPr rtlCol="0" anchor="ctr"/>
+            <a:lstStyle/>
+            <a:p>
+              <a:pPr algn="ctr"/>
+              <a:r>
+                <a:rPr lang="de-DE" dirty="0"/>
+                <a:t>Website</a:t>
+              </a:r>
+              <a:endParaRPr lang="en-US" dirty="0"/>
+            </a:p>
+          </p:txBody>
+        </p:sp>
+        <p:sp>
+          <p:nvSpPr>
+            <p:cNvPr id="14" name="Rechteck: abgerundete Ecken 13">
+              <a:extLst>
+                <a:ext uri="{FF2B5EF4-FFF2-40B4-BE49-F238E27FC236}">
+                  <a16:creationId xmlns:a16="http://schemas.microsoft.com/office/drawing/2014/main" id="{92181513-E100-C6D4-DD41-4EC087FCF5D1}"/>
+                </a:ext>
+              </a:extLst>
+            </p:cNvPr>
+            <p:cNvSpPr/>
+            <p:nvPr/>
+          </p:nvSpPr>
+          <p:spPr>
+            <a:xfrm>
+              <a:off x="9334500" y="3551960"/>
+              <a:ext cx="1629064" cy="316778"/>
+            </a:xfrm>
+            <a:prstGeom prst="roundRect">
+              <a:avLst/>
+            </a:prstGeom>
+            <a:solidFill>
+              <a:schemeClr val="accent5">
+                <a:lumMod val="20000"/>
+                <a:lumOff val="80000"/>
+                <a:alpha val="80000"/>
+              </a:schemeClr>
+            </a:solidFill>
+          </p:spPr>
+          <p:style>
+            <a:lnRef idx="2">
+              <a:schemeClr val="accent1">
+                <a:shade val="15000"/>
+              </a:schemeClr>
+            </a:lnRef>
+            <a:fillRef idx="1">
+              <a:schemeClr val="accent1"/>
+            </a:fillRef>
+            <a:effectRef idx="0">
+              <a:schemeClr val="accent1"/>
+            </a:effectRef>
+            <a:fontRef idx="minor">
+              <a:schemeClr val="lt1"/>
+            </a:fontRef>
+          </p:style>
+          <p:txBody>
+            <a:bodyPr rtlCol="0" anchor="ctr"/>
+            <a:lstStyle/>
+            <a:p>
+              <a:pPr algn="ctr"/>
+              <a:r>
+                <a:rPr lang="de-DE" dirty="0"/>
+                <a:t>Organisation</a:t>
+              </a:r>
+              <a:endParaRPr lang="en-US" dirty="0"/>
+            </a:p>
+          </p:txBody>
+        </p:sp>
+        <p:sp>
+          <p:nvSpPr>
+            <p:cNvPr id="15" name="Rechteck: abgerundete Ecken 14">
+              <a:extLst>
+                <a:ext uri="{FF2B5EF4-FFF2-40B4-BE49-F238E27FC236}">
+                  <a16:creationId xmlns:a16="http://schemas.microsoft.com/office/drawing/2014/main" id="{36E19C71-8653-97ED-E1C8-F6D99C39F133}"/>
+                </a:ext>
+              </a:extLst>
+            </p:cNvPr>
+            <p:cNvSpPr/>
+            <p:nvPr/>
+          </p:nvSpPr>
+          <p:spPr>
+            <a:xfrm>
+              <a:off x="6248400" y="3551960"/>
+              <a:ext cx="3086099" cy="316778"/>
+            </a:xfrm>
+            <a:prstGeom prst="roundRect">
+              <a:avLst/>
+            </a:prstGeom>
+            <a:solidFill>
+              <a:schemeClr val="accent5">
+                <a:lumMod val="40000"/>
+                <a:lumOff val="60000"/>
+                <a:alpha val="80000"/>
+              </a:schemeClr>
+            </a:solidFill>
+          </p:spPr>
+          <p:style>
+            <a:lnRef idx="2">
+              <a:schemeClr val="accent1">
+                <a:shade val="15000"/>
+              </a:schemeClr>
+            </a:lnRef>
+            <a:fillRef idx="1">
+              <a:schemeClr val="accent1"/>
+            </a:fillRef>
+            <a:effectRef idx="0">
+              <a:schemeClr val="accent1"/>
+            </a:effectRef>
+            <a:fontRef idx="minor">
+              <a:schemeClr val="lt1"/>
+            </a:fontRef>
+          </p:style>
+          <p:txBody>
+            <a:bodyPr rtlCol="0" anchor="ctr"/>
+            <a:lstStyle/>
+            <a:p>
+              <a:pPr algn="ctr"/>
+              <a:r>
+                <a:rPr lang="de-DE" dirty="0"/>
+                <a:t>Lehre</a:t>
+              </a:r>
+              <a:endParaRPr lang="en-US" dirty="0"/>
+            </a:p>
+          </p:txBody>
+        </p:sp>
+      </p:grpSp>
+      <p:grpSp>
+        <p:nvGrpSpPr>
+          <p:cNvPr id="24" name="Gruppieren 23">
+            <a:extLst>
+              <a:ext uri="{FF2B5EF4-FFF2-40B4-BE49-F238E27FC236}">
+                <a16:creationId xmlns:a16="http://schemas.microsoft.com/office/drawing/2014/main" id="{D5EABA41-8DDD-221F-5C9C-138A63588252}"/>
+              </a:ext>
+            </a:extLst>
+          </p:cNvPr>
+          <p:cNvGrpSpPr/>
+          <p:nvPr/>
+        </p:nvGrpSpPr>
+        <p:grpSpPr>
+          <a:xfrm>
+            <a:off x="736600" y="4916246"/>
+            <a:ext cx="10125364" cy="1059383"/>
+            <a:chOff x="838200" y="4501285"/>
+            <a:chExt cx="10125364" cy="900112"/>
+          </a:xfrm>
+        </p:grpSpPr>
+        <p:sp>
+          <p:nvSpPr>
+            <p:cNvPr id="17" name="Rechteck: abgerundete Ecken 16">
+              <a:extLst>
+                <a:ext uri="{FF2B5EF4-FFF2-40B4-BE49-F238E27FC236}">
+                  <a16:creationId xmlns:a16="http://schemas.microsoft.com/office/drawing/2014/main" id="{B5456CD6-9C43-44F8-3539-D2470314E5F4}"/>
+                </a:ext>
+              </a:extLst>
+            </p:cNvPr>
+            <p:cNvSpPr/>
+            <p:nvPr/>
+          </p:nvSpPr>
+          <p:spPr>
+            <a:xfrm>
+              <a:off x="838200" y="4501285"/>
+              <a:ext cx="10125364" cy="900112"/>
+            </a:xfrm>
+            <a:prstGeom prst="roundRect">
+              <a:avLst/>
+            </a:prstGeom>
+            <a:solidFill>
+              <a:schemeClr val="accent3">
+                <a:alpha val="80000"/>
+              </a:schemeClr>
+            </a:solidFill>
+            <a:ln>
+              <a:solidFill>
+                <a:schemeClr val="tx2">
+                  <a:lumMod val="90000"/>
+                  <a:lumOff val="10000"/>
+                </a:schemeClr>
+              </a:solidFill>
+            </a:ln>
+          </p:spPr>
+          <p:style>
+            <a:lnRef idx="2">
+              <a:schemeClr val="accent1">
+                <a:shade val="15000"/>
+              </a:schemeClr>
+            </a:lnRef>
+            <a:fillRef idx="1">
+              <a:schemeClr val="accent1"/>
+            </a:fillRef>
+            <a:effectRef idx="0">
+              <a:schemeClr val="accent1"/>
+            </a:effectRef>
+            <a:fontRef idx="minor">
+              <a:schemeClr val="lt1"/>
+            </a:fontRef>
+          </p:style>
+          <p:txBody>
+            <a:bodyPr rtlCol="0" anchor="t"/>
+            <a:lstStyle/>
+            <a:p>
+              <a:pPr algn="ctr"/>
+              <a:r>
+                <a:rPr lang="de-DE" sz="2400" b="1" dirty="0"/>
+                <a:t>Weiteres</a:t>
+              </a:r>
+              <a:endParaRPr lang="en-US" sz="2400" b="1" dirty="0"/>
+            </a:p>
+          </p:txBody>
+        </p:sp>
+        <p:sp>
+          <p:nvSpPr>
+            <p:cNvPr id="18" name="Rechteck: abgerundete Ecken 17">
+              <a:extLst>
+                <a:ext uri="{FF2B5EF4-FFF2-40B4-BE49-F238E27FC236}">
+                  <a16:creationId xmlns:a16="http://schemas.microsoft.com/office/drawing/2014/main" id="{4C7B9EB6-5CB4-0CBC-590D-FDDB0DD98082}"/>
+                </a:ext>
+              </a:extLst>
+            </p:cNvPr>
+            <p:cNvSpPr/>
+            <p:nvPr/>
+          </p:nvSpPr>
+          <p:spPr>
+            <a:xfrm>
+              <a:off x="838201" y="5084619"/>
+              <a:ext cx="3838284" cy="316778"/>
+            </a:xfrm>
+            <a:prstGeom prst="roundRect">
+              <a:avLst/>
+            </a:prstGeom>
+            <a:solidFill>
+              <a:schemeClr val="accent6">
+                <a:lumMod val="60000"/>
+                <a:lumOff val="40000"/>
+                <a:alpha val="80000"/>
+              </a:schemeClr>
+            </a:solidFill>
+          </p:spPr>
+          <p:style>
+            <a:lnRef idx="2">
+              <a:schemeClr val="accent1">
+                <a:shade val="15000"/>
+              </a:schemeClr>
+            </a:lnRef>
+            <a:fillRef idx="1">
+              <a:schemeClr val="accent1"/>
+            </a:fillRef>
+            <a:effectRef idx="0">
+              <a:schemeClr val="accent1"/>
+            </a:effectRef>
+            <a:fontRef idx="minor">
+              <a:schemeClr val="lt1"/>
+            </a:fontRef>
+          </p:style>
+          <p:txBody>
+            <a:bodyPr rtlCol="0" anchor="ctr"/>
+            <a:lstStyle/>
+            <a:p>
+              <a:pPr algn="ctr"/>
+              <a:r>
+                <a:rPr lang="de-DE" dirty="0"/>
+                <a:t>Zuarbeit </a:t>
+              </a:r>
+              <a:r>
+                <a:rPr lang="de-DE" dirty="0" err="1"/>
+                <a:t>DynaFlex</a:t>
+              </a:r>
+              <a:endParaRPr lang="en-US" dirty="0"/>
+            </a:p>
+          </p:txBody>
+        </p:sp>
+        <p:sp>
+          <p:nvSpPr>
+            <p:cNvPr id="19" name="Rechteck: abgerundete Ecken 18">
+              <a:extLst>
+                <a:ext uri="{FF2B5EF4-FFF2-40B4-BE49-F238E27FC236}">
+                  <a16:creationId xmlns:a16="http://schemas.microsoft.com/office/drawing/2014/main" id="{A7E0F6AC-A61A-667D-94C7-B6CCB07E4F46}"/>
+                </a:ext>
+              </a:extLst>
+            </p:cNvPr>
+            <p:cNvSpPr/>
+            <p:nvPr/>
+          </p:nvSpPr>
+          <p:spPr>
+            <a:xfrm>
+              <a:off x="4676486" y="5084619"/>
+              <a:ext cx="3028949" cy="316778"/>
+            </a:xfrm>
+            <a:prstGeom prst="roundRect">
+              <a:avLst/>
+            </a:prstGeom>
+            <a:solidFill>
+              <a:schemeClr val="accent6">
+                <a:lumMod val="40000"/>
+                <a:lumOff val="60000"/>
+                <a:alpha val="80000"/>
+              </a:schemeClr>
+            </a:solidFill>
+          </p:spPr>
+          <p:style>
+            <a:lnRef idx="2">
+              <a:schemeClr val="accent1">
+                <a:shade val="15000"/>
+              </a:schemeClr>
+            </a:lnRef>
+            <a:fillRef idx="1">
+              <a:schemeClr val="accent1"/>
+            </a:fillRef>
+            <a:effectRef idx="0">
+              <a:schemeClr val="accent1"/>
+            </a:effectRef>
+            <a:fontRef idx="minor">
+              <a:schemeClr val="lt1"/>
+            </a:fontRef>
+          </p:style>
+          <p:txBody>
+            <a:bodyPr rtlCol="0" anchor="ctr"/>
+            <a:lstStyle/>
+            <a:p>
+              <a:pPr algn="ctr"/>
+              <a:r>
+                <a:rPr lang="de-DE" dirty="0"/>
+                <a:t>Abschlussarbeiten</a:t>
+              </a:r>
+              <a:endParaRPr lang="en-US" dirty="0"/>
+            </a:p>
+          </p:txBody>
+        </p:sp>
+        <p:sp>
+          <p:nvSpPr>
+            <p:cNvPr id="20" name="Rechteck: abgerundete Ecken 19">
+              <a:extLst>
+                <a:ext uri="{FF2B5EF4-FFF2-40B4-BE49-F238E27FC236}">
+                  <a16:creationId xmlns:a16="http://schemas.microsoft.com/office/drawing/2014/main" id="{7EB7895E-C3BE-FA3B-9557-E9551AB67D46}"/>
+                </a:ext>
+              </a:extLst>
+            </p:cNvPr>
+            <p:cNvSpPr/>
+            <p:nvPr/>
+          </p:nvSpPr>
+          <p:spPr>
+            <a:xfrm>
+              <a:off x="9334500" y="5084619"/>
+              <a:ext cx="1629064" cy="316778"/>
+            </a:xfrm>
+            <a:prstGeom prst="roundRect">
+              <a:avLst/>
+            </a:prstGeom>
+            <a:solidFill>
+              <a:schemeClr val="accent6">
+                <a:lumMod val="20000"/>
+                <a:lumOff val="80000"/>
+                <a:alpha val="80000"/>
+              </a:schemeClr>
+            </a:solidFill>
+          </p:spPr>
+          <p:style>
+            <a:lnRef idx="2">
+              <a:schemeClr val="accent1">
+                <a:shade val="15000"/>
+              </a:schemeClr>
+            </a:lnRef>
+            <a:fillRef idx="1">
+              <a:schemeClr val="accent1"/>
+            </a:fillRef>
+            <a:effectRef idx="0">
+              <a:schemeClr val="accent1"/>
+            </a:effectRef>
+            <a:fontRef idx="minor">
+              <a:schemeClr val="lt1"/>
+            </a:fontRef>
+          </p:style>
+          <p:txBody>
+            <a:bodyPr rtlCol="0" anchor="ctr"/>
+            <a:lstStyle/>
+            <a:p>
+              <a:pPr algn="ctr"/>
+              <a:r>
+                <a:rPr lang="de-DE" dirty="0"/>
+                <a:t>etc.</a:t>
+              </a:r>
+              <a:endParaRPr lang="en-US" dirty="0"/>
+            </a:p>
+          </p:txBody>
+        </p:sp>
+        <p:sp>
+          <p:nvSpPr>
+            <p:cNvPr id="21" name="Rechteck: abgerundete Ecken 20">
+              <a:extLst>
+                <a:ext uri="{FF2B5EF4-FFF2-40B4-BE49-F238E27FC236}">
+                  <a16:creationId xmlns:a16="http://schemas.microsoft.com/office/drawing/2014/main" id="{CDB10341-A3A8-FBE9-6FD3-7F2B8371C008}"/>
+                </a:ext>
+              </a:extLst>
+            </p:cNvPr>
+            <p:cNvSpPr/>
+            <p:nvPr/>
+          </p:nvSpPr>
+          <p:spPr>
+            <a:xfrm>
+              <a:off x="7705435" y="5084619"/>
+              <a:ext cx="1629064" cy="316778"/>
+            </a:xfrm>
+            <a:prstGeom prst="roundRect">
+              <a:avLst/>
+            </a:prstGeom>
+            <a:solidFill>
+              <a:schemeClr val="accent6">
+                <a:lumMod val="40000"/>
+                <a:lumOff val="60000"/>
+                <a:alpha val="80000"/>
+              </a:schemeClr>
+            </a:solidFill>
+          </p:spPr>
+          <p:style>
+            <a:lnRef idx="2">
+              <a:schemeClr val="accent1">
+                <a:shade val="15000"/>
+              </a:schemeClr>
+            </a:lnRef>
+            <a:fillRef idx="1">
+              <a:schemeClr val="accent1"/>
+            </a:fillRef>
+            <a:effectRef idx="0">
+              <a:schemeClr val="accent1"/>
+            </a:effectRef>
+            <a:fontRef idx="minor">
+              <a:schemeClr val="lt1"/>
+            </a:fontRef>
+          </p:style>
+          <p:txBody>
+            <a:bodyPr rtlCol="0" anchor="ctr"/>
+            <a:lstStyle/>
+            <a:p>
+              <a:pPr algn="ctr"/>
+              <a:r>
+                <a:rPr lang="de-DE" dirty="0"/>
+                <a:t>Schreiben</a:t>
+              </a:r>
+              <a:endParaRPr lang="en-US" dirty="0"/>
+            </a:p>
+          </p:txBody>
+        </p:sp>
+      </p:grpSp>
     </p:spTree>
     <p:extLst>
       <p:ext uri="{BB962C8B-B14F-4D97-AF65-F5344CB8AC3E}">
-        <p14:creationId xmlns:p14="http://schemas.microsoft.com/office/powerpoint/2010/main" val="1662364544"/>
+        <p14:creationId xmlns:p14="http://schemas.microsoft.com/office/powerpoint/2010/main" val="208148714"/>
       </p:ext>
     </p:extLst>
   </p:cSld>

</xml_diff>